<commit_message>
- set scroll-behaviour to smooth - update design and implement changes
</commit_message>
<xml_diff>
--- a/docs/concepts/1.0.0/design.pptx
+++ b/docs/concepts/1.0.0/design.pptx
@@ -8,9 +8,8 @@
     <p:sldId id="256" r:id="rId2"/>
     <p:sldId id="257" r:id="rId3"/>
     <p:sldId id="263" r:id="rId4"/>
-    <p:sldId id="264" r:id="rId5"/>
-    <p:sldId id="259" r:id="rId6"/>
-    <p:sldId id="260" r:id="rId7"/>
+    <p:sldId id="259" r:id="rId5"/>
+    <p:sldId id="260" r:id="rId6"/>
   </p:sldIdLst>
   <p:sldSz cx="12192000" cy="6858000"/>
   <p:notesSz cx="6858000" cy="9144000"/>
@@ -125,7 +124,6 @@
         <p14:section name="Experience" id="{1C8E3502-1D06-47E6-8F76-57873551A896}">
           <p14:sldIdLst>
             <p14:sldId id="263"/>
-            <p14:sldId id="264"/>
           </p14:sldIdLst>
         </p14:section>
         <p14:section name="Projects" id="{C98288EA-154D-4891-B026-67C0C21E540C}">
@@ -277,11 +275,11 @@
 
 <file path=ppt/comments/modernComment_107_9B7E1A73.xml><?xml version="1.0" encoding="utf-8"?>
 <p188:cmLst xmlns:a="http://schemas.openxmlformats.org/drawingml/2006/main" xmlns:r="http://schemas.openxmlformats.org/officeDocument/2006/relationships" xmlns:p188="http://schemas.microsoft.com/office/powerpoint/2018/8/main">
-  <p188:cm id="{96B5342F-C241-48E6-AB06-377747E2C0E2}" authorId="{C2ECC90E-57AC-EA91-4A6B-95D462BCA3F8}" created="2023-09-05T16:49:52.474">
+  <p188:cm id="{198640E8-92B3-4489-A581-89842D0F90F2}" authorId="{C2ECC90E-57AC-EA91-4A6B-95D462BCA3F8}" created="2023-09-05T22:10:51.297">
     <ac:deMkLst xmlns:ac="http://schemas.microsoft.com/office/drawing/2013/main/command">
       <pc:docMk xmlns:pc="http://schemas.microsoft.com/office/powerpoint/2013/main/command"/>
       <pc:sldMk xmlns:pc="http://schemas.microsoft.com/office/powerpoint/2013/main/command" cId="2608732787" sldId="263"/>
-      <ac:spMk id="47" creationId="{7063C671-8ADD-10A0-EEC6-692778F4921A}"/>
+      <ac:spMk id="7" creationId="{733ECC9B-ECEE-F1B8-1822-6A56FD13D3D9}"/>
     </ac:deMkLst>
     <p188:txBody>
       <a:bodyPr/>
@@ -289,29 +287,7 @@
       <a:p>
         <a:r>
           <a:rPr lang="en-CA"/>
-          <a:t>Clicking this should toggle an information panel (WTR).</a:t>
-        </a:r>
-      </a:p>
-    </p188:txBody>
-  </p188:cm>
-</p188:cmLst>
-</file>
-
-<file path=ppt/comments/modernComment_108_2E7D852B.xml><?xml version="1.0" encoding="utf-8"?>
-<p188:cmLst xmlns:a="http://schemas.openxmlformats.org/drawingml/2006/main" xmlns:r="http://schemas.openxmlformats.org/officeDocument/2006/relationships" xmlns:p188="http://schemas.microsoft.com/office/powerpoint/2018/8/main">
-  <p188:cm id="{68F3A12D-18EC-4578-808A-5DEB895F7754}" authorId="{C2ECC90E-57AC-EA91-4A6B-95D462BCA3F8}" created="2023-09-05T16:50:35.885">
-    <ac:deMkLst xmlns:ac="http://schemas.microsoft.com/office/drawing/2013/main/command">
-      <pc:docMk xmlns:pc="http://schemas.microsoft.com/office/powerpoint/2013/main/command"/>
-      <pc:sldMk xmlns:pc="http://schemas.microsoft.com/office/powerpoint/2013/main/command" cId="779978027" sldId="264"/>
-      <ac:spMk id="12" creationId="{313941BE-ED8C-AB33-4870-FE216E335CA8}"/>
-    </ac:deMkLst>
-    <p188:txBody>
-      <a:bodyPr/>
-      <a:lstStyle/>
-      <a:p>
-        <a:r>
-          <a:rPr lang="en-CA"/>
-          <a:t>Clicking this should close the information panel.</a:t>
+          <a:t>Clicking this should open a link to the work term report in a new tab.</a:t>
         </a:r>
       </a:p>
     </p188:txBody>
@@ -7258,7 +7234,7 @@
           <a:lstStyle/>
           <a:p>
             <a:r>
-              <a:rPr lang="en-CA" sz="2000" dirty="0">
+              <a:rPr lang="en-CA" sz="2000" i="1" dirty="0">
                 <a:solidFill>
                   <a:schemeClr val="bg1">
                     <a:lumMod val="95000"/>
@@ -8093,139 +8069,65 @@
           </a:p>
         </p:txBody>
       </p:sp>
-      <p:grpSp>
-        <p:nvGrpSpPr>
-          <p:cNvPr id="5" name="Group 4">
+      <p:sp>
+        <p:nvSpPr>
+          <p:cNvPr id="7" name="Rectangle: Rounded Corners 6">
             <a:extLst>
               <a:ext uri="{FF2B5EF4-FFF2-40B4-BE49-F238E27FC236}">
-                <a16:creationId xmlns:a16="http://schemas.microsoft.com/office/drawing/2014/main" id="{4CE48ABD-22EB-D734-E309-30F2E933C1D7}"/>
+                <a16:creationId xmlns:a16="http://schemas.microsoft.com/office/drawing/2014/main" id="{733ECC9B-ECEE-F1B8-1822-6A56FD13D3D9}"/>
               </a:ext>
             </a:extLst>
           </p:cNvPr>
-          <p:cNvGrpSpPr/>
+          <p:cNvSpPr/>
           <p:nvPr/>
-        </p:nvGrpSpPr>
-        <p:grpSpPr>
+        </p:nvSpPr>
+        <p:spPr>
           <a:xfrm>
-            <a:off x="11530506" y="227137"/>
-            <a:ext cx="288000" cy="288000"/>
-            <a:chOff x="11656966" y="229877"/>
-            <a:chExt cx="288000" cy="288000"/>
+            <a:off x="11259778" y="198932"/>
+            <a:ext cx="642026" cy="322991"/>
           </a:xfrm>
-        </p:grpSpPr>
-        <p:sp>
-          <p:nvSpPr>
-            <p:cNvPr id="47" name="Oval 46">
-              <a:extLst>
-                <a:ext uri="{FF2B5EF4-FFF2-40B4-BE49-F238E27FC236}">
-                  <a16:creationId xmlns:a16="http://schemas.microsoft.com/office/drawing/2014/main" id="{7063C671-8ADD-10A0-EEC6-692778F4921A}"/>
-                </a:ext>
-              </a:extLst>
-            </p:cNvPr>
-            <p:cNvSpPr/>
-            <p:nvPr/>
-          </p:nvSpPr>
-          <p:spPr>
-            <a:xfrm>
-              <a:off x="11656966" y="229877"/>
-              <a:ext cx="288000" cy="288000"/>
-            </a:xfrm>
-            <a:prstGeom prst="ellipse">
-              <a:avLst/>
-            </a:prstGeom>
-            <a:noFill/>
-            <a:ln w="12700">
-              <a:solidFill>
-                <a:schemeClr val="accent1">
-                  <a:lumMod val="40000"/>
-                  <a:lumOff val="60000"/>
-                </a:schemeClr>
-              </a:solidFill>
-            </a:ln>
-          </p:spPr>
-          <p:style>
-            <a:lnRef idx="2">
+          <a:prstGeom prst="roundRect">
+            <a:avLst/>
+          </a:prstGeom>
+          <a:noFill/>
+          <a:ln w="19050">
+            <a:solidFill>
               <a:schemeClr val="accent1">
-                <a:shade val="15000"/>
-              </a:schemeClr>
-            </a:lnRef>
-            <a:fillRef idx="1">
-              <a:schemeClr val="accent1"/>
-            </a:fillRef>
-            <a:effectRef idx="0">
-              <a:schemeClr val="accent1"/>
-            </a:effectRef>
-            <a:fontRef idx="minor">
-              <a:schemeClr val="lt1"/>
-            </a:fontRef>
-          </p:style>
-          <p:txBody>
-            <a:bodyPr rtlCol="0" anchor="ctr"/>
-            <a:lstStyle/>
-            <a:p>
-              <a:pPr algn="ctr"/>
-              <a:endParaRPr lang="en-CA" sz="1200" dirty="0"/>
-            </a:p>
-          </p:txBody>
-        </p:sp>
-        <p:sp>
-          <p:nvSpPr>
-            <p:cNvPr id="4" name="Plus Sign 3">
-              <a:extLst>
-                <a:ext uri="{FF2B5EF4-FFF2-40B4-BE49-F238E27FC236}">
-                  <a16:creationId xmlns:a16="http://schemas.microsoft.com/office/drawing/2014/main" id="{B3FBADA4-2E55-D8A3-B9D3-C4A381B5C981}"/>
-                </a:ext>
-              </a:extLst>
-            </p:cNvPr>
-            <p:cNvSpPr/>
-            <p:nvPr/>
-          </p:nvSpPr>
-          <p:spPr>
-            <a:xfrm flipV="1">
-              <a:off x="11694279" y="271700"/>
-              <a:ext cx="216000" cy="216000"/>
-            </a:xfrm>
-            <a:prstGeom prst="mathPlus">
-              <a:avLst/>
-            </a:prstGeom>
-            <a:solidFill>
-              <a:schemeClr val="bg1">
-                <a:lumMod val="95000"/>
+                <a:lumMod val="20000"/>
+                <a:lumOff val="80000"/>
               </a:schemeClr>
             </a:solidFill>
-            <a:ln>
-              <a:noFill/>
-            </a:ln>
-          </p:spPr>
-          <p:style>
-            <a:lnRef idx="2">
-              <a:schemeClr val="accent1">
-                <a:shade val="15000"/>
-              </a:schemeClr>
-            </a:lnRef>
-            <a:fillRef idx="1">
-              <a:schemeClr val="accent1"/>
-            </a:fillRef>
-            <a:effectRef idx="0">
-              <a:schemeClr val="accent1"/>
-            </a:effectRef>
-            <a:fontRef idx="minor">
-              <a:schemeClr val="lt1"/>
-            </a:fontRef>
-          </p:style>
-          <p:txBody>
-            <a:bodyPr rtlCol="0" anchor="ctr"/>
-            <a:lstStyle/>
-            <a:p>
-              <a:pPr algn="ctr"/>
-              <a:endParaRPr lang="en-CA" dirty="0">
-                <a:latin typeface="Courier New" panose="02070309020205020404" pitchFamily="49" charset="0"/>
-                <a:cs typeface="Courier New" panose="02070309020205020404" pitchFamily="49" charset="0"/>
-              </a:endParaRPr>
-            </a:p>
-          </p:txBody>
-        </p:sp>
-      </p:grpSp>
+          </a:ln>
+        </p:spPr>
+        <p:style>
+          <a:lnRef idx="2">
+            <a:schemeClr val="accent1">
+              <a:shade val="15000"/>
+            </a:schemeClr>
+          </a:lnRef>
+          <a:fillRef idx="1">
+            <a:schemeClr val="accent1"/>
+          </a:fillRef>
+          <a:effectRef idx="0">
+            <a:schemeClr val="accent1"/>
+          </a:effectRef>
+          <a:fontRef idx="minor">
+            <a:schemeClr val="lt1"/>
+          </a:fontRef>
+        </p:style>
+        <p:txBody>
+          <a:bodyPr rtlCol="0" anchor="ctr"/>
+          <a:lstStyle/>
+          <a:p>
+            <a:pPr algn="ctr"/>
+            <a:r>
+              <a:rPr lang="en-US" sz="1600" dirty="0"/>
+              <a:t>WTR</a:t>
+            </a:r>
+            <a:endParaRPr lang="en-CA" sz="1600" dirty="0"/>
+          </a:p>
+        </p:txBody>
+      </p:sp>
     </p:spTree>
     <p:extLst>
       <p:ext uri="{BB962C8B-B14F-4D97-AF65-F5344CB8AC3E}">
@@ -8363,7 +8265,7 @@
                             </p:stCondLst>
                             <p:childTnLst>
                               <p:par>
-                                <p:cTn id="15" presetID="10" presetClass="entr" presetSubtype="0" fill="hold" nodeType="clickEffect">
+                                <p:cTn id="15" presetID="10" presetClass="entr" presetSubtype="0" fill="hold" grpId="0" nodeType="clickEffect">
                                   <p:stCondLst>
                                     <p:cond delay="0"/>
                                   </p:stCondLst>
@@ -8376,7 +8278,7 @@
                                           </p:stCondLst>
                                         </p:cTn>
                                         <p:tgtEl>
-                                          <p:spTgt spid="5"/>
+                                          <p:spTgt spid="7"/>
                                         </p:tgtEl>
                                         <p:attrNameLst>
                                           <p:attrName>style.visibility</p:attrName>
@@ -8390,7 +8292,7 @@
                                       <p:cBhvr>
                                         <p:cTn id="17" dur="500"/>
                                         <p:tgtEl>
-                                          <p:spTgt spid="5"/>
+                                          <p:spTgt spid="7"/>
                                         </p:tgtEl>
                                       </p:cBhvr>
                                     </p:animEffect>
@@ -8823,6 +8725,7 @@
       <p:bldP spid="14" grpId="0"/>
       <p:bldP spid="15" grpId="0"/>
       <p:bldP spid="16" grpId="0"/>
+      <p:bldP spid="7" grpId="0" animBg="1"/>
     </p:bldLst>
   </p:timing>
   <p:extLst>
@@ -8834,2592 +8737,6 @@
 </file>
 
 <file path=ppt/slides/slide4.xml><?xml version="1.0" encoding="utf-8"?>
-<p:sld xmlns:a="http://schemas.openxmlformats.org/drawingml/2006/main" xmlns:r="http://schemas.openxmlformats.org/officeDocument/2006/relationships" xmlns:p="http://schemas.openxmlformats.org/presentationml/2006/main">
-  <p:cSld>
-    <p:spTree>
-      <p:nvGrpSpPr>
-        <p:cNvPr id="1" name=""/>
-        <p:cNvGrpSpPr/>
-        <p:nvPr/>
-      </p:nvGrpSpPr>
-      <p:grpSpPr>
-        <a:xfrm>
-          <a:off x="0" y="0"/>
-          <a:ext cx="0" cy="0"/>
-          <a:chOff x="0" y="0"/>
-          <a:chExt cx="0" cy="0"/>
-        </a:xfrm>
-      </p:grpSpPr>
-      <p:sp>
-        <p:nvSpPr>
-          <p:cNvPr id="9" name="Rectangle 8">
-            <a:extLst>
-              <a:ext uri="{FF2B5EF4-FFF2-40B4-BE49-F238E27FC236}">
-                <a16:creationId xmlns:a16="http://schemas.microsoft.com/office/drawing/2014/main" id="{BCE873C8-AD98-5077-43D8-187EDD20D9E9}"/>
-              </a:ext>
-            </a:extLst>
-          </p:cNvPr>
-          <p:cNvSpPr>
-            <a:spLocks noGrp="1" noRot="1" noMove="1" noResize="1" noEditPoints="1" noAdjustHandles="1" noChangeArrowheads="1" noChangeShapeType="1"/>
-          </p:cNvSpPr>
-          <p:nvPr/>
-        </p:nvSpPr>
-        <p:spPr>
-          <a:xfrm>
-            <a:off x="0" y="0"/>
-            <a:ext cx="12192000" cy="6857999"/>
-          </a:xfrm>
-          <a:prstGeom prst="rect">
-            <a:avLst/>
-          </a:prstGeom>
-          <a:solidFill>
-            <a:srgbClr val="1B222B"/>
-          </a:solidFill>
-          <a:ln>
-            <a:solidFill>
-              <a:schemeClr val="tx1"/>
-            </a:solidFill>
-          </a:ln>
-        </p:spPr>
-        <p:style>
-          <a:lnRef idx="2">
-            <a:schemeClr val="accent1">
-              <a:shade val="15000"/>
-            </a:schemeClr>
-          </a:lnRef>
-          <a:fillRef idx="1">
-            <a:schemeClr val="accent1"/>
-          </a:fillRef>
-          <a:effectRef idx="0">
-            <a:schemeClr val="accent1"/>
-          </a:effectRef>
-          <a:fontRef idx="minor">
-            <a:schemeClr val="lt1"/>
-          </a:fontRef>
-        </p:style>
-        <p:txBody>
-          <a:bodyPr rtlCol="0" anchor="ctr"/>
-          <a:lstStyle/>
-          <a:p>
-            <a:pPr algn="ctr"/>
-            <a:endParaRPr lang="en-CA" dirty="0"/>
-          </a:p>
-        </p:txBody>
-      </p:sp>
-      <p:grpSp>
-        <p:nvGrpSpPr>
-          <p:cNvPr id="54" name="Group 53">
-            <a:extLst>
-              <a:ext uri="{FF2B5EF4-FFF2-40B4-BE49-F238E27FC236}">
-                <a16:creationId xmlns:a16="http://schemas.microsoft.com/office/drawing/2014/main" id="{6504EA8A-F4E3-FE13-976B-6FCB131170CA}"/>
-              </a:ext>
-            </a:extLst>
-          </p:cNvPr>
-          <p:cNvGrpSpPr/>
-          <p:nvPr/>
-        </p:nvGrpSpPr>
-        <p:grpSpPr>
-          <a:xfrm>
-            <a:off x="343361" y="2173427"/>
-            <a:ext cx="2191931" cy="2433340"/>
-            <a:chOff x="343361" y="2173427"/>
-            <a:chExt cx="2191931" cy="2433340"/>
-          </a:xfrm>
-        </p:grpSpPr>
-        <p:grpSp>
-          <p:nvGrpSpPr>
-            <p:cNvPr id="31" name="Group 30">
-              <a:extLst>
-                <a:ext uri="{FF2B5EF4-FFF2-40B4-BE49-F238E27FC236}">
-                  <a16:creationId xmlns:a16="http://schemas.microsoft.com/office/drawing/2014/main" id="{0137C6E9-3594-552B-294E-0F9DB3C2FEA7}"/>
-                </a:ext>
-              </a:extLst>
-            </p:cNvPr>
-            <p:cNvGrpSpPr/>
-            <p:nvPr/>
-          </p:nvGrpSpPr>
-          <p:grpSpPr>
-            <a:xfrm>
-              <a:off x="343362" y="2173427"/>
-              <a:ext cx="2191930" cy="1776115"/>
-              <a:chOff x="343362" y="2173427"/>
-              <a:chExt cx="2191930" cy="1776115"/>
-            </a:xfrm>
-          </p:grpSpPr>
-          <p:sp>
-            <p:nvSpPr>
-              <p:cNvPr id="32" name="TextBox 31">
-                <a:extLst>
-                  <a:ext uri="{FF2B5EF4-FFF2-40B4-BE49-F238E27FC236}">
-                    <a16:creationId xmlns:a16="http://schemas.microsoft.com/office/drawing/2014/main" id="{5777CD19-D0AC-BD64-D329-592BCBF02278}"/>
-                  </a:ext>
-                </a:extLst>
-              </p:cNvPr>
-              <p:cNvSpPr txBox="1"/>
-              <p:nvPr/>
-            </p:nvSpPr>
-            <p:spPr>
-              <a:xfrm>
-                <a:off x="343364" y="2173427"/>
-                <a:ext cx="1392392" cy="461665"/>
-              </a:xfrm>
-              <a:prstGeom prst="rect">
-                <a:avLst/>
-              </a:prstGeom>
-              <a:noFill/>
-            </p:spPr>
-            <p:txBody>
-              <a:bodyPr wrap="square" rtlCol="0">
-                <a:spAutoFit/>
-              </a:bodyPr>
-              <a:lstStyle/>
-              <a:p>
-                <a:r>
-                  <a:rPr lang="en-US" sz="2400" dirty="0">
-                    <a:solidFill>
-                      <a:schemeClr val="bg1"/>
-                    </a:solidFill>
-                    <a:latin typeface="Arial" panose="020B0604020202020204" pitchFamily="34" charset="0"/>
-                    <a:cs typeface="Arial" panose="020B0604020202020204" pitchFamily="34" charset="0"/>
-                  </a:rPr>
-                  <a:t>ABOUT</a:t>
-                </a:r>
-                <a:endParaRPr lang="en-CA" sz="2400" dirty="0">
-                  <a:solidFill>
-                    <a:schemeClr val="bg1"/>
-                  </a:solidFill>
-                  <a:latin typeface="Arial" panose="020B0604020202020204" pitchFamily="34" charset="0"/>
-                  <a:cs typeface="Arial" panose="020B0604020202020204" pitchFamily="34" charset="0"/>
-                </a:endParaRPr>
-              </a:p>
-            </p:txBody>
-          </p:sp>
-          <p:sp>
-            <p:nvSpPr>
-              <p:cNvPr id="33" name="TextBox 32">
-                <a:extLst>
-                  <a:ext uri="{FF2B5EF4-FFF2-40B4-BE49-F238E27FC236}">
-                    <a16:creationId xmlns:a16="http://schemas.microsoft.com/office/drawing/2014/main" id="{17361E8A-F692-49C8-E695-621A99EEE29C}"/>
-                  </a:ext>
-                </a:extLst>
-              </p:cNvPr>
-              <p:cNvSpPr txBox="1"/>
-              <p:nvPr/>
-            </p:nvSpPr>
-            <p:spPr>
-              <a:xfrm>
-                <a:off x="343363" y="2830652"/>
-                <a:ext cx="2191929" cy="461665"/>
-              </a:xfrm>
-              <a:prstGeom prst="rect">
-                <a:avLst/>
-              </a:prstGeom>
-              <a:noFill/>
-            </p:spPr>
-            <p:txBody>
-              <a:bodyPr wrap="square" rtlCol="0">
-                <a:spAutoFit/>
-              </a:bodyPr>
-              <a:lstStyle/>
-              <a:p>
-                <a:r>
-                  <a:rPr lang="en-US" sz="2400" b="1" dirty="0">
-                    <a:solidFill>
-                      <a:schemeClr val="bg1"/>
-                    </a:solidFill>
-                    <a:latin typeface="Arial" panose="020B0604020202020204" pitchFamily="34" charset="0"/>
-                    <a:cs typeface="Arial" panose="020B0604020202020204" pitchFamily="34" charset="0"/>
-                  </a:rPr>
-                  <a:t>EXPERIENCE</a:t>
-                </a:r>
-                <a:endParaRPr lang="en-CA" sz="2400" b="1" dirty="0">
-                  <a:solidFill>
-                    <a:schemeClr val="bg1"/>
-                  </a:solidFill>
-                  <a:latin typeface="Arial" panose="020B0604020202020204" pitchFamily="34" charset="0"/>
-                  <a:cs typeface="Arial" panose="020B0604020202020204" pitchFamily="34" charset="0"/>
-                </a:endParaRPr>
-              </a:p>
-            </p:txBody>
-          </p:sp>
-          <p:sp>
-            <p:nvSpPr>
-              <p:cNvPr id="34" name="TextBox 33">
-                <a:extLst>
-                  <a:ext uri="{FF2B5EF4-FFF2-40B4-BE49-F238E27FC236}">
-                    <a16:creationId xmlns:a16="http://schemas.microsoft.com/office/drawing/2014/main" id="{58F115E3-F8CE-B729-C827-7C1FFE91D9C0}"/>
-                  </a:ext>
-                </a:extLst>
-              </p:cNvPr>
-              <p:cNvSpPr txBox="1"/>
-              <p:nvPr/>
-            </p:nvSpPr>
-            <p:spPr>
-              <a:xfrm>
-                <a:off x="343362" y="3487877"/>
-                <a:ext cx="2191929" cy="461665"/>
-              </a:xfrm>
-              <a:prstGeom prst="rect">
-                <a:avLst/>
-              </a:prstGeom>
-              <a:noFill/>
-            </p:spPr>
-            <p:txBody>
-              <a:bodyPr wrap="square" rtlCol="0">
-                <a:spAutoFit/>
-              </a:bodyPr>
-              <a:lstStyle/>
-              <a:p>
-                <a:r>
-                  <a:rPr lang="en-US" sz="2400" dirty="0">
-                    <a:solidFill>
-                      <a:schemeClr val="bg1"/>
-                    </a:solidFill>
-                    <a:latin typeface="Arial" panose="020B0604020202020204" pitchFamily="34" charset="0"/>
-                    <a:cs typeface="Arial" panose="020B0604020202020204" pitchFamily="34" charset="0"/>
-                  </a:rPr>
-                  <a:t>PROJECTS</a:t>
-                </a:r>
-                <a:endParaRPr lang="en-CA" sz="2400" dirty="0">
-                  <a:solidFill>
-                    <a:schemeClr val="bg1"/>
-                  </a:solidFill>
-                  <a:latin typeface="Arial" panose="020B0604020202020204" pitchFamily="34" charset="0"/>
-                  <a:cs typeface="Arial" panose="020B0604020202020204" pitchFamily="34" charset="0"/>
-                </a:endParaRPr>
-              </a:p>
-            </p:txBody>
-          </p:sp>
-        </p:grpSp>
-        <p:sp>
-          <p:nvSpPr>
-            <p:cNvPr id="36" name="TextBox 35">
-              <a:extLst>
-                <a:ext uri="{FF2B5EF4-FFF2-40B4-BE49-F238E27FC236}">
-                  <a16:creationId xmlns:a16="http://schemas.microsoft.com/office/drawing/2014/main" id="{466C0B5C-B93E-5E0A-9BA4-ECE2D93FD829}"/>
-                </a:ext>
-              </a:extLst>
-            </p:cNvPr>
-            <p:cNvSpPr txBox="1"/>
-            <p:nvPr/>
-          </p:nvSpPr>
-          <p:spPr>
-            <a:xfrm>
-              <a:off x="343361" y="4145102"/>
-              <a:ext cx="2191929" cy="461665"/>
-            </a:xfrm>
-            <a:prstGeom prst="rect">
-              <a:avLst/>
-            </a:prstGeom>
-            <a:noFill/>
-          </p:spPr>
-          <p:txBody>
-            <a:bodyPr wrap="square" rtlCol="0">
-              <a:spAutoFit/>
-            </a:bodyPr>
-            <a:lstStyle/>
-            <a:p>
-              <a:r>
-                <a:rPr lang="en-US" sz="2400" dirty="0">
-                  <a:solidFill>
-                    <a:schemeClr val="bg1"/>
-                  </a:solidFill>
-                  <a:latin typeface="Arial" panose="020B0604020202020204" pitchFamily="34" charset="0"/>
-                  <a:cs typeface="Arial" panose="020B0604020202020204" pitchFamily="34" charset="0"/>
-                </a:rPr>
-                <a:t>CONTACT</a:t>
-              </a:r>
-              <a:endParaRPr lang="en-CA" sz="2400" dirty="0">
-                <a:solidFill>
-                  <a:schemeClr val="bg1"/>
-                </a:solidFill>
-                <a:latin typeface="Arial" panose="020B0604020202020204" pitchFamily="34" charset="0"/>
-                <a:cs typeface="Arial" panose="020B0604020202020204" pitchFamily="34" charset="0"/>
-              </a:endParaRPr>
-            </a:p>
-          </p:txBody>
-        </p:sp>
-      </p:grpSp>
-      <p:sp>
-        <p:nvSpPr>
-          <p:cNvPr id="41" name="Rectangle: Rounded Corners 40">
-            <a:extLst>
-              <a:ext uri="{FF2B5EF4-FFF2-40B4-BE49-F238E27FC236}">
-                <a16:creationId xmlns:a16="http://schemas.microsoft.com/office/drawing/2014/main" id="{F245FB1E-6503-7A13-9A03-7A0297173FF5}"/>
-              </a:ext>
-            </a:extLst>
-          </p:cNvPr>
-          <p:cNvSpPr/>
-          <p:nvPr/>
-        </p:nvSpPr>
-        <p:spPr>
-          <a:xfrm>
-            <a:off x="5320490" y="852206"/>
-            <a:ext cx="650582" cy="293492"/>
-          </a:xfrm>
-          <a:prstGeom prst="roundRect">
-            <a:avLst>
-              <a:gd name="adj" fmla="val 50000"/>
-            </a:avLst>
-          </a:prstGeom>
-          <a:solidFill>
-            <a:schemeClr val="accent1">
-              <a:lumMod val="50000"/>
-            </a:schemeClr>
-          </a:solidFill>
-          <a:ln>
-            <a:noFill/>
-          </a:ln>
-        </p:spPr>
-        <p:style>
-          <a:lnRef idx="2">
-            <a:schemeClr val="accent1">
-              <a:shade val="15000"/>
-            </a:schemeClr>
-          </a:lnRef>
-          <a:fillRef idx="1">
-            <a:schemeClr val="accent1"/>
-          </a:fillRef>
-          <a:effectRef idx="0">
-            <a:schemeClr val="accent1"/>
-          </a:effectRef>
-          <a:fontRef idx="minor">
-            <a:schemeClr val="lt1"/>
-          </a:fontRef>
-        </p:style>
-        <p:txBody>
-          <a:bodyPr rtlCol="0" anchor="ctr"/>
-          <a:lstStyle/>
-          <a:p>
-            <a:pPr algn="ctr"/>
-            <a:r>
-              <a:rPr lang="en-US" sz="1200" b="1" dirty="0">
-                <a:solidFill>
-                  <a:schemeClr val="bg1"/>
-                </a:solidFill>
-              </a:rPr>
-              <a:t>Skill</a:t>
-            </a:r>
-            <a:endParaRPr lang="en-CA" sz="1200" b="1" dirty="0">
-              <a:solidFill>
-                <a:schemeClr val="bg1"/>
-              </a:solidFill>
-            </a:endParaRPr>
-          </a:p>
-        </p:txBody>
-      </p:sp>
-      <p:sp>
-        <p:nvSpPr>
-          <p:cNvPr id="42" name="Rectangle: Rounded Corners 41">
-            <a:extLst>
-              <a:ext uri="{FF2B5EF4-FFF2-40B4-BE49-F238E27FC236}">
-                <a16:creationId xmlns:a16="http://schemas.microsoft.com/office/drawing/2014/main" id="{92870774-2BE2-DD38-4FBD-97CED8720B9C}"/>
-              </a:ext>
-            </a:extLst>
-          </p:cNvPr>
-          <p:cNvSpPr/>
-          <p:nvPr/>
-        </p:nvSpPr>
-        <p:spPr>
-          <a:xfrm>
-            <a:off x="7009394" y="840681"/>
-            <a:ext cx="650582" cy="293492"/>
-          </a:xfrm>
-          <a:prstGeom prst="roundRect">
-            <a:avLst>
-              <a:gd name="adj" fmla="val 50000"/>
-            </a:avLst>
-          </a:prstGeom>
-          <a:solidFill>
-            <a:schemeClr val="accent1">
-              <a:lumMod val="50000"/>
-            </a:schemeClr>
-          </a:solidFill>
-          <a:ln>
-            <a:noFill/>
-          </a:ln>
-        </p:spPr>
-        <p:style>
-          <a:lnRef idx="2">
-            <a:schemeClr val="accent1">
-              <a:shade val="15000"/>
-            </a:schemeClr>
-          </a:lnRef>
-          <a:fillRef idx="1">
-            <a:schemeClr val="accent1"/>
-          </a:fillRef>
-          <a:effectRef idx="0">
-            <a:schemeClr val="accent1"/>
-          </a:effectRef>
-          <a:fontRef idx="minor">
-            <a:schemeClr val="lt1"/>
-          </a:fontRef>
-        </p:style>
-        <p:txBody>
-          <a:bodyPr rtlCol="0" anchor="ctr"/>
-          <a:lstStyle/>
-          <a:p>
-            <a:pPr algn="ctr"/>
-            <a:r>
-              <a:rPr lang="en-US" sz="1200" b="1" dirty="0">
-                <a:solidFill>
-                  <a:schemeClr val="bg1"/>
-                </a:solidFill>
-              </a:rPr>
-              <a:t>Skill</a:t>
-            </a:r>
-            <a:endParaRPr lang="en-CA" sz="1200" b="1" dirty="0">
-              <a:solidFill>
-                <a:schemeClr val="bg1"/>
-              </a:solidFill>
-            </a:endParaRPr>
-          </a:p>
-        </p:txBody>
-      </p:sp>
-      <p:sp>
-        <p:nvSpPr>
-          <p:cNvPr id="43" name="Rectangle: Rounded Corners 42">
-            <a:extLst>
-              <a:ext uri="{FF2B5EF4-FFF2-40B4-BE49-F238E27FC236}">
-                <a16:creationId xmlns:a16="http://schemas.microsoft.com/office/drawing/2014/main" id="{B40DB6F6-B395-21BD-E25A-B67C0A1A1C79}"/>
-              </a:ext>
-            </a:extLst>
-          </p:cNvPr>
-          <p:cNvSpPr/>
-          <p:nvPr/>
-        </p:nvSpPr>
-        <p:spPr>
-          <a:xfrm>
-            <a:off x="8698298" y="832222"/>
-            <a:ext cx="650582" cy="293492"/>
-          </a:xfrm>
-          <a:prstGeom prst="roundRect">
-            <a:avLst>
-              <a:gd name="adj" fmla="val 50000"/>
-            </a:avLst>
-          </a:prstGeom>
-          <a:solidFill>
-            <a:schemeClr val="accent1">
-              <a:lumMod val="50000"/>
-            </a:schemeClr>
-          </a:solidFill>
-          <a:ln>
-            <a:noFill/>
-          </a:ln>
-        </p:spPr>
-        <p:style>
-          <a:lnRef idx="2">
-            <a:schemeClr val="accent1">
-              <a:shade val="15000"/>
-            </a:schemeClr>
-          </a:lnRef>
-          <a:fillRef idx="1">
-            <a:schemeClr val="accent1"/>
-          </a:fillRef>
-          <a:effectRef idx="0">
-            <a:schemeClr val="accent1"/>
-          </a:effectRef>
-          <a:fontRef idx="minor">
-            <a:schemeClr val="lt1"/>
-          </a:fontRef>
-        </p:style>
-        <p:txBody>
-          <a:bodyPr rtlCol="0" anchor="ctr"/>
-          <a:lstStyle/>
-          <a:p>
-            <a:pPr algn="ctr"/>
-            <a:r>
-              <a:rPr lang="en-US" sz="1200" b="1" dirty="0">
-                <a:solidFill>
-                  <a:schemeClr val="bg1"/>
-                </a:solidFill>
-              </a:rPr>
-              <a:t>Skill</a:t>
-            </a:r>
-            <a:endParaRPr lang="en-CA" sz="1200" b="1" dirty="0">
-              <a:solidFill>
-                <a:schemeClr val="bg1"/>
-              </a:solidFill>
-            </a:endParaRPr>
-          </a:p>
-        </p:txBody>
-      </p:sp>
-      <p:sp>
-        <p:nvSpPr>
-          <p:cNvPr id="44" name="Rectangle: Rounded Corners 43">
-            <a:extLst>
-              <a:ext uri="{FF2B5EF4-FFF2-40B4-BE49-F238E27FC236}">
-                <a16:creationId xmlns:a16="http://schemas.microsoft.com/office/drawing/2014/main" id="{673AA5C0-1B7D-9C97-EB34-581D8B34B759}"/>
-              </a:ext>
-            </a:extLst>
-          </p:cNvPr>
-          <p:cNvSpPr/>
-          <p:nvPr/>
-        </p:nvSpPr>
-        <p:spPr>
-          <a:xfrm>
-            <a:off x="7853846" y="840681"/>
-            <a:ext cx="650582" cy="293492"/>
-          </a:xfrm>
-          <a:prstGeom prst="roundRect">
-            <a:avLst>
-              <a:gd name="adj" fmla="val 50000"/>
-            </a:avLst>
-          </a:prstGeom>
-          <a:solidFill>
-            <a:schemeClr val="accent1">
-              <a:lumMod val="50000"/>
-            </a:schemeClr>
-          </a:solidFill>
-          <a:ln>
-            <a:noFill/>
-          </a:ln>
-        </p:spPr>
-        <p:style>
-          <a:lnRef idx="2">
-            <a:schemeClr val="accent1">
-              <a:shade val="15000"/>
-            </a:schemeClr>
-          </a:lnRef>
-          <a:fillRef idx="1">
-            <a:schemeClr val="accent1"/>
-          </a:fillRef>
-          <a:effectRef idx="0">
-            <a:schemeClr val="accent1"/>
-          </a:effectRef>
-          <a:fontRef idx="minor">
-            <a:schemeClr val="lt1"/>
-          </a:fontRef>
-        </p:style>
-        <p:txBody>
-          <a:bodyPr rtlCol="0" anchor="ctr"/>
-          <a:lstStyle/>
-          <a:p>
-            <a:pPr algn="ctr"/>
-            <a:r>
-              <a:rPr lang="en-US" sz="1200" b="1" dirty="0">
-                <a:solidFill>
-                  <a:schemeClr val="bg1"/>
-                </a:solidFill>
-              </a:rPr>
-              <a:t>Skill</a:t>
-            </a:r>
-            <a:endParaRPr lang="en-CA" sz="1200" b="1" dirty="0">
-              <a:solidFill>
-                <a:schemeClr val="bg1"/>
-              </a:solidFill>
-            </a:endParaRPr>
-          </a:p>
-        </p:txBody>
-      </p:sp>
-      <p:sp>
-        <p:nvSpPr>
-          <p:cNvPr id="46" name="Rectangle: Rounded Corners 45">
-            <a:extLst>
-              <a:ext uri="{FF2B5EF4-FFF2-40B4-BE49-F238E27FC236}">
-                <a16:creationId xmlns:a16="http://schemas.microsoft.com/office/drawing/2014/main" id="{16372B60-4526-DF84-44D6-3C375A471089}"/>
-              </a:ext>
-            </a:extLst>
-          </p:cNvPr>
-          <p:cNvSpPr/>
-          <p:nvPr/>
-        </p:nvSpPr>
-        <p:spPr>
-          <a:xfrm>
-            <a:off x="6164942" y="853933"/>
-            <a:ext cx="650582" cy="293492"/>
-          </a:xfrm>
-          <a:prstGeom prst="roundRect">
-            <a:avLst>
-              <a:gd name="adj" fmla="val 50000"/>
-            </a:avLst>
-          </a:prstGeom>
-          <a:solidFill>
-            <a:schemeClr val="accent1">
-              <a:lumMod val="50000"/>
-            </a:schemeClr>
-          </a:solidFill>
-          <a:ln>
-            <a:noFill/>
-          </a:ln>
-        </p:spPr>
-        <p:style>
-          <a:lnRef idx="2">
-            <a:schemeClr val="accent1">
-              <a:shade val="15000"/>
-            </a:schemeClr>
-          </a:lnRef>
-          <a:fillRef idx="1">
-            <a:schemeClr val="accent1"/>
-          </a:fillRef>
-          <a:effectRef idx="0">
-            <a:schemeClr val="accent1"/>
-          </a:effectRef>
-          <a:fontRef idx="minor">
-            <a:schemeClr val="lt1"/>
-          </a:fontRef>
-        </p:style>
-        <p:txBody>
-          <a:bodyPr rtlCol="0" anchor="ctr"/>
-          <a:lstStyle/>
-          <a:p>
-            <a:pPr algn="ctr"/>
-            <a:r>
-              <a:rPr lang="en-US" sz="1200" b="1" dirty="0">
-                <a:solidFill>
-                  <a:schemeClr val="bg1"/>
-                </a:solidFill>
-              </a:rPr>
-              <a:t>Skill</a:t>
-            </a:r>
-            <a:endParaRPr lang="en-CA" sz="1200" b="1" dirty="0">
-              <a:solidFill>
-                <a:schemeClr val="bg1"/>
-              </a:solidFill>
-            </a:endParaRPr>
-          </a:p>
-        </p:txBody>
-      </p:sp>
-      <p:grpSp>
-        <p:nvGrpSpPr>
-          <p:cNvPr id="51" name="Group 50">
-            <a:extLst>
-              <a:ext uri="{FF2B5EF4-FFF2-40B4-BE49-F238E27FC236}">
-                <a16:creationId xmlns:a16="http://schemas.microsoft.com/office/drawing/2014/main" id="{24DCB45B-B640-D033-889D-C22D9101810F}"/>
-              </a:ext>
-            </a:extLst>
-          </p:cNvPr>
-          <p:cNvGrpSpPr/>
-          <p:nvPr/>
-        </p:nvGrpSpPr>
-        <p:grpSpPr>
-          <a:xfrm>
-            <a:off x="343361" y="6352178"/>
-            <a:ext cx="328368" cy="270067"/>
-            <a:chOff x="284993" y="6400815"/>
-            <a:chExt cx="328368" cy="270067"/>
-          </a:xfrm>
-        </p:grpSpPr>
-        <p:sp>
-          <p:nvSpPr>
-            <p:cNvPr id="52" name="Oval 51">
-              <a:extLst>
-                <a:ext uri="{FF2B5EF4-FFF2-40B4-BE49-F238E27FC236}">
-                  <a16:creationId xmlns:a16="http://schemas.microsoft.com/office/drawing/2014/main" id="{07C44BD8-DEFE-69D9-04BD-DC69524D3DD2}"/>
-                </a:ext>
-              </a:extLst>
-            </p:cNvPr>
-            <p:cNvSpPr/>
-            <p:nvPr/>
-          </p:nvSpPr>
-          <p:spPr>
-            <a:xfrm>
-              <a:off x="343361" y="6400815"/>
-              <a:ext cx="270000" cy="270000"/>
-            </a:xfrm>
-            <a:prstGeom prst="ellipse">
-              <a:avLst/>
-            </a:prstGeom>
-            <a:solidFill>
-              <a:schemeClr val="bg1">
-                <a:lumMod val="85000"/>
-              </a:schemeClr>
-            </a:solidFill>
-            <a:ln>
-              <a:solidFill>
-                <a:schemeClr val="bg1">
-                  <a:lumMod val="75000"/>
-                </a:schemeClr>
-              </a:solidFill>
-            </a:ln>
-          </p:spPr>
-          <p:style>
-            <a:lnRef idx="2">
-              <a:schemeClr val="accent1">
-                <a:shade val="15000"/>
-              </a:schemeClr>
-            </a:lnRef>
-            <a:fillRef idx="1">
-              <a:schemeClr val="accent1"/>
-            </a:fillRef>
-            <a:effectRef idx="0">
-              <a:schemeClr val="accent1"/>
-            </a:effectRef>
-            <a:fontRef idx="minor">
-              <a:schemeClr val="lt1"/>
-            </a:fontRef>
-          </p:style>
-          <p:txBody>
-            <a:bodyPr rtlCol="0" anchor="ctr"/>
-            <a:lstStyle/>
-            <a:p>
-              <a:pPr algn="ctr"/>
-              <a:endParaRPr lang="en-CA"/>
-            </a:p>
-          </p:txBody>
-        </p:sp>
-        <p:sp>
-          <p:nvSpPr>
-            <p:cNvPr id="53" name="Oval 48">
-              <a:extLst>
-                <a:ext uri="{FF2B5EF4-FFF2-40B4-BE49-F238E27FC236}">
-                  <a16:creationId xmlns:a16="http://schemas.microsoft.com/office/drawing/2014/main" id="{AF2ED254-6074-54ED-0B69-E8247C8A7D44}"/>
-                </a:ext>
-              </a:extLst>
-            </p:cNvPr>
-            <p:cNvSpPr/>
-            <p:nvPr/>
-          </p:nvSpPr>
-          <p:spPr>
-            <a:xfrm flipH="1">
-              <a:off x="284993" y="6400815"/>
-              <a:ext cx="328368" cy="270067"/>
-            </a:xfrm>
-            <a:prstGeom prst="pie">
-              <a:avLst>
-                <a:gd name="adj1" fmla="val 5320635"/>
-                <a:gd name="adj2" fmla="val 16200000"/>
-              </a:avLst>
-            </a:prstGeom>
-            <a:solidFill>
-              <a:schemeClr val="tx1"/>
-            </a:solidFill>
-            <a:ln>
-              <a:solidFill>
-                <a:schemeClr val="bg1">
-                  <a:lumMod val="75000"/>
-                </a:schemeClr>
-              </a:solidFill>
-            </a:ln>
-          </p:spPr>
-          <p:style>
-            <a:lnRef idx="2">
-              <a:schemeClr val="accent1">
-                <a:shade val="15000"/>
-              </a:schemeClr>
-            </a:lnRef>
-            <a:fillRef idx="1">
-              <a:schemeClr val="accent1"/>
-            </a:fillRef>
-            <a:effectRef idx="0">
-              <a:schemeClr val="accent1"/>
-            </a:effectRef>
-            <a:fontRef idx="minor">
-              <a:schemeClr val="lt1"/>
-            </a:fontRef>
-          </p:style>
-          <p:txBody>
-            <a:bodyPr rtlCol="0" anchor="ctr"/>
-            <a:lstStyle/>
-            <a:p>
-              <a:pPr algn="ctr"/>
-              <a:endParaRPr lang="en-CA"/>
-            </a:p>
-          </p:txBody>
-        </p:sp>
-      </p:grpSp>
-      <p:sp>
-        <p:nvSpPr>
-          <p:cNvPr id="21" name="TextBox 20">
-            <a:extLst>
-              <a:ext uri="{FF2B5EF4-FFF2-40B4-BE49-F238E27FC236}">
-                <a16:creationId xmlns:a16="http://schemas.microsoft.com/office/drawing/2014/main" id="{3497EEE1-E196-FC2D-CF6D-B7C4DB7E9C59}"/>
-              </a:ext>
-            </a:extLst>
-          </p:cNvPr>
-          <p:cNvSpPr txBox="1"/>
-          <p:nvPr/>
-        </p:nvSpPr>
-        <p:spPr>
-          <a:xfrm>
-            <a:off x="2358568" y="148208"/>
-            <a:ext cx="2849124" cy="400110"/>
-          </a:xfrm>
-          <a:prstGeom prst="rect">
-            <a:avLst/>
-          </a:prstGeom>
-          <a:noFill/>
-        </p:spPr>
-        <p:txBody>
-          <a:bodyPr wrap="square" rtlCol="0">
-            <a:spAutoFit/>
-          </a:bodyPr>
-          <a:lstStyle/>
-          <a:p>
-            <a:r>
-              <a:rPr lang="en-CA" sz="2000" i="1" dirty="0">
-                <a:solidFill>
-                  <a:schemeClr val="bg1">
-                    <a:lumMod val="95000"/>
-                  </a:schemeClr>
-                </a:solidFill>
-              </a:rPr>
-              <a:t>Month – Month Year</a:t>
-            </a:r>
-          </a:p>
-        </p:txBody>
-      </p:sp>
-      <p:sp>
-        <p:nvSpPr>
-          <p:cNvPr id="22" name="TextBox 21">
-            <a:extLst>
-              <a:ext uri="{FF2B5EF4-FFF2-40B4-BE49-F238E27FC236}">
-                <a16:creationId xmlns:a16="http://schemas.microsoft.com/office/drawing/2014/main" id="{CA06C6ED-021C-9622-B9FB-F4CEF1F2C838}"/>
-              </a:ext>
-            </a:extLst>
-          </p:cNvPr>
-          <p:cNvSpPr txBox="1"/>
-          <p:nvPr/>
-        </p:nvSpPr>
-        <p:spPr>
-          <a:xfrm>
-            <a:off x="5229719" y="114245"/>
-            <a:ext cx="2849124" cy="461665"/>
-          </a:xfrm>
-          <a:prstGeom prst="rect">
-            <a:avLst/>
-          </a:prstGeom>
-          <a:noFill/>
-        </p:spPr>
-        <p:txBody>
-          <a:bodyPr wrap="square" rtlCol="0">
-            <a:spAutoFit/>
-          </a:bodyPr>
-          <a:lstStyle/>
-          <a:p>
-            <a:r>
-              <a:rPr lang="en-CA" sz="2400" dirty="0">
-                <a:solidFill>
-                  <a:schemeClr val="bg1">
-                    <a:lumMod val="95000"/>
-                  </a:schemeClr>
-                </a:solidFill>
-              </a:rPr>
-              <a:t>Position @ Employer</a:t>
-            </a:r>
-          </a:p>
-        </p:txBody>
-      </p:sp>
-      <p:grpSp>
-        <p:nvGrpSpPr>
-          <p:cNvPr id="28" name="Group 27">
-            <a:extLst>
-              <a:ext uri="{FF2B5EF4-FFF2-40B4-BE49-F238E27FC236}">
-                <a16:creationId xmlns:a16="http://schemas.microsoft.com/office/drawing/2014/main" id="{F0AE868A-004D-4AFD-073A-D3BF40B4B186}"/>
-              </a:ext>
-            </a:extLst>
-          </p:cNvPr>
-          <p:cNvGrpSpPr/>
-          <p:nvPr/>
-        </p:nvGrpSpPr>
-        <p:grpSpPr>
-          <a:xfrm>
-            <a:off x="11530506" y="227137"/>
-            <a:ext cx="288000" cy="288000"/>
-            <a:chOff x="11656966" y="229877"/>
-            <a:chExt cx="288000" cy="288000"/>
-          </a:xfrm>
-        </p:grpSpPr>
-        <p:sp>
-          <p:nvSpPr>
-            <p:cNvPr id="29" name="Oval 28">
-              <a:extLst>
-                <a:ext uri="{FF2B5EF4-FFF2-40B4-BE49-F238E27FC236}">
-                  <a16:creationId xmlns:a16="http://schemas.microsoft.com/office/drawing/2014/main" id="{9926250F-D88F-1BDA-D2F7-3EF231F92781}"/>
-                </a:ext>
-              </a:extLst>
-            </p:cNvPr>
-            <p:cNvSpPr/>
-            <p:nvPr/>
-          </p:nvSpPr>
-          <p:spPr>
-            <a:xfrm>
-              <a:off x="11656966" y="229877"/>
-              <a:ext cx="288000" cy="288000"/>
-            </a:xfrm>
-            <a:prstGeom prst="ellipse">
-              <a:avLst/>
-            </a:prstGeom>
-            <a:noFill/>
-            <a:ln w="12700">
-              <a:solidFill>
-                <a:schemeClr val="accent1">
-                  <a:lumMod val="40000"/>
-                  <a:lumOff val="60000"/>
-                </a:schemeClr>
-              </a:solidFill>
-            </a:ln>
-          </p:spPr>
-          <p:style>
-            <a:lnRef idx="2">
-              <a:schemeClr val="accent1">
-                <a:shade val="15000"/>
-              </a:schemeClr>
-            </a:lnRef>
-            <a:fillRef idx="1">
-              <a:schemeClr val="accent1"/>
-            </a:fillRef>
-            <a:effectRef idx="0">
-              <a:schemeClr val="accent1"/>
-            </a:effectRef>
-            <a:fontRef idx="minor">
-              <a:schemeClr val="lt1"/>
-            </a:fontRef>
-          </p:style>
-          <p:txBody>
-            <a:bodyPr rtlCol="0" anchor="ctr"/>
-            <a:lstStyle/>
-            <a:p>
-              <a:pPr algn="ctr"/>
-              <a:endParaRPr lang="en-CA" sz="1200" dirty="0"/>
-            </a:p>
-          </p:txBody>
-        </p:sp>
-        <p:sp>
-          <p:nvSpPr>
-            <p:cNvPr id="30" name="Plus Sign 29">
-              <a:extLst>
-                <a:ext uri="{FF2B5EF4-FFF2-40B4-BE49-F238E27FC236}">
-                  <a16:creationId xmlns:a16="http://schemas.microsoft.com/office/drawing/2014/main" id="{FE6B362D-AB77-1F0A-D536-28F857BAE844}"/>
-                </a:ext>
-              </a:extLst>
-            </p:cNvPr>
-            <p:cNvSpPr/>
-            <p:nvPr/>
-          </p:nvSpPr>
-          <p:spPr>
-            <a:xfrm flipV="1">
-              <a:off x="11694279" y="271700"/>
-              <a:ext cx="216000" cy="216000"/>
-            </a:xfrm>
-            <a:prstGeom prst="mathPlus">
-              <a:avLst/>
-            </a:prstGeom>
-            <a:solidFill>
-              <a:schemeClr val="bg1">
-                <a:lumMod val="95000"/>
-              </a:schemeClr>
-            </a:solidFill>
-            <a:ln>
-              <a:noFill/>
-            </a:ln>
-          </p:spPr>
-          <p:style>
-            <a:lnRef idx="2">
-              <a:schemeClr val="accent1">
-                <a:shade val="15000"/>
-              </a:schemeClr>
-            </a:lnRef>
-            <a:fillRef idx="1">
-              <a:schemeClr val="accent1"/>
-            </a:fillRef>
-            <a:effectRef idx="0">
-              <a:schemeClr val="accent1"/>
-            </a:effectRef>
-            <a:fontRef idx="minor">
-              <a:schemeClr val="lt1"/>
-            </a:fontRef>
-          </p:style>
-          <p:txBody>
-            <a:bodyPr rtlCol="0" anchor="ctr"/>
-            <a:lstStyle/>
-            <a:p>
-              <a:pPr algn="ctr"/>
-              <a:endParaRPr lang="en-CA" dirty="0">
-                <a:latin typeface="Courier New" panose="02070309020205020404" pitchFamily="49" charset="0"/>
-                <a:cs typeface="Courier New" panose="02070309020205020404" pitchFamily="49" charset="0"/>
-              </a:endParaRPr>
-            </a:p>
-          </p:txBody>
-        </p:sp>
-      </p:grpSp>
-      <p:grpSp>
-        <p:nvGrpSpPr>
-          <p:cNvPr id="27" name="Group 26">
-            <a:extLst>
-              <a:ext uri="{FF2B5EF4-FFF2-40B4-BE49-F238E27FC236}">
-                <a16:creationId xmlns:a16="http://schemas.microsoft.com/office/drawing/2014/main" id="{64D27B82-AD42-4864-1DDC-DDBB388F6423}"/>
-              </a:ext>
-            </a:extLst>
-          </p:cNvPr>
-          <p:cNvGrpSpPr/>
-          <p:nvPr/>
-        </p:nvGrpSpPr>
-        <p:grpSpPr>
-          <a:xfrm>
-            <a:off x="5320490" y="148209"/>
-            <a:ext cx="6671485" cy="5637462"/>
-            <a:chOff x="5320490" y="148209"/>
-            <a:chExt cx="6671485" cy="5637462"/>
-          </a:xfrm>
-        </p:grpSpPr>
-        <p:sp>
-          <p:nvSpPr>
-            <p:cNvPr id="6" name="Rectangle: Rounded Corners 5">
-              <a:extLst>
-                <a:ext uri="{FF2B5EF4-FFF2-40B4-BE49-F238E27FC236}">
-                  <a16:creationId xmlns:a16="http://schemas.microsoft.com/office/drawing/2014/main" id="{55EC6D80-C56E-AC67-7914-6556EAFE6BDE}"/>
-                </a:ext>
-              </a:extLst>
-            </p:cNvPr>
-            <p:cNvSpPr/>
-            <p:nvPr/>
-          </p:nvSpPr>
-          <p:spPr>
-            <a:xfrm>
-              <a:off x="5320490" y="148209"/>
-              <a:ext cx="6671485" cy="5637462"/>
-            </a:xfrm>
-            <a:prstGeom prst="roundRect">
-              <a:avLst>
-                <a:gd name="adj" fmla="val 2437"/>
-              </a:avLst>
-            </a:prstGeom>
-            <a:solidFill>
-              <a:srgbClr val="203864"/>
-            </a:solidFill>
-            <a:ln>
-              <a:noFill/>
-            </a:ln>
-          </p:spPr>
-          <p:style>
-            <a:lnRef idx="2">
-              <a:schemeClr val="accent1">
-                <a:shade val="15000"/>
-              </a:schemeClr>
-            </a:lnRef>
-            <a:fillRef idx="1">
-              <a:schemeClr val="accent1"/>
-            </a:fillRef>
-            <a:effectRef idx="0">
-              <a:schemeClr val="accent1"/>
-            </a:effectRef>
-            <a:fontRef idx="minor">
-              <a:schemeClr val="lt1"/>
-            </a:fontRef>
-          </p:style>
-          <p:txBody>
-            <a:bodyPr rtlCol="0" anchor="ctr"/>
-            <a:lstStyle/>
-            <a:p>
-              <a:pPr algn="ctr"/>
-              <a:endParaRPr lang="en-CA"/>
-            </a:p>
-          </p:txBody>
-        </p:sp>
-        <p:grpSp>
-          <p:nvGrpSpPr>
-            <p:cNvPr id="7" name="Group 6">
-              <a:extLst>
-                <a:ext uri="{FF2B5EF4-FFF2-40B4-BE49-F238E27FC236}">
-                  <a16:creationId xmlns:a16="http://schemas.microsoft.com/office/drawing/2014/main" id="{10F60BA3-0488-3B32-63B5-62A24353FEF6}"/>
-                </a:ext>
-              </a:extLst>
-            </p:cNvPr>
-            <p:cNvGrpSpPr/>
-            <p:nvPr/>
-          </p:nvGrpSpPr>
-          <p:grpSpPr>
-            <a:xfrm>
-              <a:off x="11882236" y="157937"/>
-              <a:ext cx="101088" cy="5618006"/>
-              <a:chOff x="11961953" y="836757"/>
-              <a:chExt cx="75139" cy="4898744"/>
-            </a:xfrm>
-          </p:grpSpPr>
-          <p:sp>
-            <p:nvSpPr>
-              <p:cNvPr id="17" name="Rectangle: Rounded Corners 16">
-                <a:extLst>
-                  <a:ext uri="{FF2B5EF4-FFF2-40B4-BE49-F238E27FC236}">
-                    <a16:creationId xmlns:a16="http://schemas.microsoft.com/office/drawing/2014/main" id="{252288B2-130C-BF86-1D03-212E5087B0E5}"/>
-                  </a:ext>
-                </a:extLst>
-              </p:cNvPr>
-              <p:cNvSpPr/>
-              <p:nvPr/>
-            </p:nvSpPr>
-            <p:spPr>
-              <a:xfrm>
-                <a:off x="11961953" y="836757"/>
-                <a:ext cx="75139" cy="4898744"/>
-              </a:xfrm>
-              <a:prstGeom prst="roundRect">
-                <a:avLst/>
-              </a:prstGeom>
-              <a:solidFill>
-                <a:schemeClr val="accent1">
-                  <a:lumMod val="75000"/>
-                </a:schemeClr>
-              </a:solidFill>
-              <a:ln>
-                <a:noFill/>
-              </a:ln>
-            </p:spPr>
-            <p:style>
-              <a:lnRef idx="2">
-                <a:schemeClr val="accent1">
-                  <a:shade val="15000"/>
-                </a:schemeClr>
-              </a:lnRef>
-              <a:fillRef idx="1">
-                <a:schemeClr val="accent1"/>
-              </a:fillRef>
-              <a:effectRef idx="0">
-                <a:schemeClr val="accent1"/>
-              </a:effectRef>
-              <a:fontRef idx="minor">
-                <a:schemeClr val="lt1"/>
-              </a:fontRef>
-            </p:style>
-            <p:txBody>
-              <a:bodyPr rtlCol="0" anchor="ctr"/>
-              <a:lstStyle/>
-              <a:p>
-                <a:pPr algn="ctr"/>
-                <a:endParaRPr lang="en-CA"/>
-              </a:p>
-            </p:txBody>
-          </p:sp>
-          <p:sp>
-            <p:nvSpPr>
-              <p:cNvPr id="18" name="Rectangle: Rounded Corners 17">
-                <a:extLst>
-                  <a:ext uri="{FF2B5EF4-FFF2-40B4-BE49-F238E27FC236}">
-                    <a16:creationId xmlns:a16="http://schemas.microsoft.com/office/drawing/2014/main" id="{81D08C7E-FF93-CF5A-B19A-3C9F7DB5FE2B}"/>
-                  </a:ext>
-                </a:extLst>
-              </p:cNvPr>
-              <p:cNvSpPr/>
-              <p:nvPr/>
-            </p:nvSpPr>
-            <p:spPr>
-              <a:xfrm>
-                <a:off x="11961953" y="1217757"/>
-                <a:ext cx="75139" cy="618173"/>
-              </a:xfrm>
-              <a:prstGeom prst="roundRect">
-                <a:avLst/>
-              </a:prstGeom>
-              <a:solidFill>
-                <a:schemeClr val="tx2">
-                  <a:lumMod val="40000"/>
-                  <a:lumOff val="60000"/>
-                </a:schemeClr>
-              </a:solidFill>
-              <a:ln>
-                <a:noFill/>
-              </a:ln>
-            </p:spPr>
-            <p:style>
-              <a:lnRef idx="2">
-                <a:schemeClr val="accent1">
-                  <a:shade val="15000"/>
-                </a:schemeClr>
-              </a:lnRef>
-              <a:fillRef idx="1">
-                <a:schemeClr val="accent1"/>
-              </a:fillRef>
-              <a:effectRef idx="0">
-                <a:schemeClr val="accent1"/>
-              </a:effectRef>
-              <a:fontRef idx="minor">
-                <a:schemeClr val="lt1"/>
-              </a:fontRef>
-            </p:style>
-            <p:txBody>
-              <a:bodyPr rtlCol="0" anchor="ctr"/>
-              <a:lstStyle/>
-              <a:p>
-                <a:pPr algn="ctr"/>
-                <a:endParaRPr lang="en-CA"/>
-              </a:p>
-            </p:txBody>
-          </p:sp>
-        </p:grpSp>
-        <p:sp>
-          <p:nvSpPr>
-            <p:cNvPr id="8" name="TextBox 7">
-              <a:extLst>
-                <a:ext uri="{FF2B5EF4-FFF2-40B4-BE49-F238E27FC236}">
-                  <a16:creationId xmlns:a16="http://schemas.microsoft.com/office/drawing/2014/main" id="{7577FBA7-BF9C-CE1E-3AAC-4A8B3E1FDB6E}"/>
-                </a:ext>
-              </a:extLst>
-            </p:cNvPr>
-            <p:cNvSpPr txBox="1"/>
-            <p:nvPr/>
-          </p:nvSpPr>
-          <p:spPr>
-            <a:xfrm>
-              <a:off x="5320490" y="229877"/>
-              <a:ext cx="6148474" cy="307777"/>
-            </a:xfrm>
-            <a:prstGeom prst="rect">
-              <a:avLst/>
-            </a:prstGeom>
-            <a:noFill/>
-          </p:spPr>
-          <p:txBody>
-            <a:bodyPr wrap="square" rtlCol="0">
-              <a:spAutoFit/>
-            </a:bodyPr>
-            <a:lstStyle/>
-            <a:p>
-              <a:r>
-                <a:rPr lang="en-CA" sz="1400" dirty="0">
-                  <a:solidFill>
-                    <a:schemeClr val="bg1">
-                      <a:lumMod val="95000"/>
-                    </a:schemeClr>
-                  </a:solidFill>
-                </a:rPr>
-                <a:t>Vestibulum </a:t>
-              </a:r>
-              <a:r>
-                <a:rPr lang="en-CA" sz="1400" dirty="0" err="1">
-                  <a:solidFill>
-                    <a:schemeClr val="bg1">
-                      <a:lumMod val="95000"/>
-                    </a:schemeClr>
-                  </a:solidFill>
-                </a:rPr>
-                <a:t>urna</a:t>
-              </a:r>
-              <a:r>
-                <a:rPr lang="en-CA" sz="1400" dirty="0">
-                  <a:solidFill>
-                    <a:schemeClr val="bg1">
-                      <a:lumMod val="95000"/>
-                    </a:schemeClr>
-                  </a:solidFill>
-                </a:rPr>
-                <a:t> magna, </a:t>
-              </a:r>
-              <a:r>
-                <a:rPr lang="en-CA" sz="1400" dirty="0" err="1">
-                  <a:solidFill>
-                    <a:schemeClr val="bg1">
-                      <a:lumMod val="95000"/>
-                    </a:schemeClr>
-                  </a:solidFill>
-                </a:rPr>
-                <a:t>lobortis</a:t>
-              </a:r>
-              <a:r>
-                <a:rPr lang="en-CA" sz="1400" dirty="0">
-                  <a:solidFill>
-                    <a:schemeClr val="bg1">
-                      <a:lumMod val="95000"/>
-                    </a:schemeClr>
-                  </a:solidFill>
-                </a:rPr>
-                <a:t> a </a:t>
-              </a:r>
-              <a:r>
-                <a:rPr lang="en-CA" sz="1400" dirty="0" err="1">
-                  <a:solidFill>
-                    <a:schemeClr val="bg1">
-                      <a:lumMod val="95000"/>
-                    </a:schemeClr>
-                  </a:solidFill>
-                </a:rPr>
-                <a:t>nisl</a:t>
-              </a:r>
-              <a:r>
-                <a:rPr lang="en-CA" sz="1400" dirty="0">
-                  <a:solidFill>
-                    <a:schemeClr val="bg1">
-                      <a:lumMod val="95000"/>
-                    </a:schemeClr>
-                  </a:solidFill>
-                </a:rPr>
-                <a:t> sit </a:t>
-              </a:r>
-              <a:r>
-                <a:rPr lang="en-CA" sz="1400" dirty="0" err="1">
-                  <a:solidFill>
-                    <a:schemeClr val="bg1">
-                      <a:lumMod val="95000"/>
-                    </a:schemeClr>
-                  </a:solidFill>
-                </a:rPr>
-                <a:t>amet</a:t>
-              </a:r>
-              <a:r>
-                <a:rPr lang="en-CA" sz="1400" dirty="0">
-                  <a:solidFill>
-                    <a:schemeClr val="bg1">
-                      <a:lumMod val="95000"/>
-                    </a:schemeClr>
-                  </a:solidFill>
-                </a:rPr>
-                <a:t>, </a:t>
-              </a:r>
-              <a:r>
-                <a:rPr lang="en-CA" sz="1400" dirty="0" err="1">
-                  <a:solidFill>
-                    <a:schemeClr val="bg1">
-                      <a:lumMod val="95000"/>
-                    </a:schemeClr>
-                  </a:solidFill>
-                </a:rPr>
-                <a:t>ultricies</a:t>
-              </a:r>
-              <a:r>
-                <a:rPr lang="en-CA" sz="1400" dirty="0">
-                  <a:solidFill>
-                    <a:schemeClr val="bg1">
-                      <a:lumMod val="95000"/>
-                    </a:schemeClr>
-                  </a:solidFill>
-                </a:rPr>
-                <a:t> </a:t>
-              </a:r>
-              <a:r>
-                <a:rPr lang="en-CA" sz="1400" dirty="0" err="1">
-                  <a:solidFill>
-                    <a:schemeClr val="bg1">
-                      <a:lumMod val="95000"/>
-                    </a:schemeClr>
-                  </a:solidFill>
-                </a:rPr>
-                <a:t>finibus</a:t>
-              </a:r>
-              <a:r>
-                <a:rPr lang="en-CA" sz="1400" dirty="0">
-                  <a:solidFill>
-                    <a:schemeClr val="bg1">
-                      <a:lumMod val="95000"/>
-                    </a:schemeClr>
-                  </a:solidFill>
-                </a:rPr>
-                <a:t> </a:t>
-              </a:r>
-              <a:r>
-                <a:rPr lang="en-CA" sz="1400" dirty="0" err="1">
-                  <a:solidFill>
-                    <a:schemeClr val="bg1">
-                      <a:lumMod val="95000"/>
-                    </a:schemeClr>
-                  </a:solidFill>
-                </a:rPr>
-                <a:t>neque</a:t>
-              </a:r>
-              <a:r>
-                <a:rPr lang="en-CA" sz="1400" dirty="0">
-                  <a:solidFill>
-                    <a:schemeClr val="bg1">
-                      <a:lumMod val="95000"/>
-                    </a:schemeClr>
-                  </a:solidFill>
-                </a:rPr>
-                <a:t>. </a:t>
-              </a:r>
-            </a:p>
-          </p:txBody>
-        </p:sp>
-        <p:sp>
-          <p:nvSpPr>
-            <p:cNvPr id="11" name="TextBox 10">
-              <a:extLst>
-                <a:ext uri="{FF2B5EF4-FFF2-40B4-BE49-F238E27FC236}">
-                  <a16:creationId xmlns:a16="http://schemas.microsoft.com/office/drawing/2014/main" id="{D83F0E2C-6CFF-43A7-6DDD-905D7AAE1A5D}"/>
-                </a:ext>
-              </a:extLst>
-            </p:cNvPr>
-            <p:cNvSpPr txBox="1"/>
-            <p:nvPr/>
-          </p:nvSpPr>
-          <p:spPr>
-            <a:xfrm>
-              <a:off x="5320490" y="698263"/>
-              <a:ext cx="6528147" cy="523220"/>
-            </a:xfrm>
-            <a:prstGeom prst="rect">
-              <a:avLst/>
-            </a:prstGeom>
-            <a:noFill/>
-          </p:spPr>
-          <p:txBody>
-            <a:bodyPr wrap="square" rtlCol="0">
-              <a:spAutoFit/>
-            </a:bodyPr>
-            <a:lstStyle/>
-            <a:p>
-              <a:r>
-                <a:rPr lang="en-CA" sz="1400" dirty="0" err="1">
-                  <a:solidFill>
-                    <a:schemeClr val="bg1">
-                      <a:lumMod val="95000"/>
-                    </a:schemeClr>
-                  </a:solidFill>
-                </a:rPr>
-                <a:t>Orci</a:t>
-              </a:r>
-              <a:r>
-                <a:rPr lang="en-CA" sz="1400" dirty="0">
-                  <a:solidFill>
-                    <a:schemeClr val="bg1">
-                      <a:lumMod val="95000"/>
-                    </a:schemeClr>
-                  </a:solidFill>
-                </a:rPr>
-                <a:t> </a:t>
-              </a:r>
-              <a:r>
-                <a:rPr lang="en-CA" sz="1400" dirty="0" err="1">
-                  <a:solidFill>
-                    <a:schemeClr val="bg1">
-                      <a:lumMod val="95000"/>
-                    </a:schemeClr>
-                  </a:solidFill>
-                </a:rPr>
-                <a:t>varius</a:t>
-              </a:r>
-              <a:r>
-                <a:rPr lang="en-CA" sz="1400" dirty="0">
-                  <a:solidFill>
-                    <a:schemeClr val="bg1">
-                      <a:lumMod val="95000"/>
-                    </a:schemeClr>
-                  </a:solidFill>
-                </a:rPr>
-                <a:t> </a:t>
-              </a:r>
-              <a:r>
-                <a:rPr lang="en-CA" sz="1400" dirty="0" err="1">
-                  <a:solidFill>
-                    <a:schemeClr val="bg1">
-                      <a:lumMod val="95000"/>
-                    </a:schemeClr>
-                  </a:solidFill>
-                </a:rPr>
-                <a:t>natoque</a:t>
-              </a:r>
-              <a:r>
-                <a:rPr lang="en-CA" sz="1400" dirty="0">
-                  <a:solidFill>
-                    <a:schemeClr val="bg1">
-                      <a:lumMod val="95000"/>
-                    </a:schemeClr>
-                  </a:solidFill>
-                </a:rPr>
-                <a:t> </a:t>
-              </a:r>
-              <a:r>
-                <a:rPr lang="en-CA" sz="1400" dirty="0" err="1">
-                  <a:solidFill>
-                    <a:schemeClr val="bg1">
-                      <a:lumMod val="95000"/>
-                    </a:schemeClr>
-                  </a:solidFill>
-                </a:rPr>
-                <a:t>penatibus</a:t>
-              </a:r>
-              <a:r>
-                <a:rPr lang="en-CA" sz="1400" dirty="0">
-                  <a:solidFill>
-                    <a:schemeClr val="bg1">
-                      <a:lumMod val="95000"/>
-                    </a:schemeClr>
-                  </a:solidFill>
-                </a:rPr>
-                <a:t> et </a:t>
-              </a:r>
-              <a:r>
-                <a:rPr lang="en-CA" sz="1400" dirty="0" err="1">
-                  <a:solidFill>
-                    <a:schemeClr val="bg1">
-                      <a:lumMod val="95000"/>
-                    </a:schemeClr>
-                  </a:solidFill>
-                </a:rPr>
-                <a:t>magnis</a:t>
-              </a:r>
-              <a:r>
-                <a:rPr lang="en-CA" sz="1400" dirty="0">
-                  <a:solidFill>
-                    <a:schemeClr val="bg1">
-                      <a:lumMod val="95000"/>
-                    </a:schemeClr>
-                  </a:solidFill>
-                </a:rPr>
-                <a:t> dis parturient </a:t>
-              </a:r>
-              <a:r>
-                <a:rPr lang="en-CA" sz="1400" dirty="0" err="1">
-                  <a:solidFill>
-                    <a:schemeClr val="bg1">
-                      <a:lumMod val="95000"/>
-                    </a:schemeClr>
-                  </a:solidFill>
-                </a:rPr>
-                <a:t>montes</a:t>
-              </a:r>
-              <a:r>
-                <a:rPr lang="en-CA" sz="1400" dirty="0">
-                  <a:solidFill>
-                    <a:schemeClr val="bg1">
-                      <a:lumMod val="95000"/>
-                    </a:schemeClr>
-                  </a:solidFill>
-                </a:rPr>
-                <a:t>, </a:t>
-              </a:r>
-              <a:r>
-                <a:rPr lang="en-CA" sz="1400" dirty="0" err="1">
-                  <a:solidFill>
-                    <a:schemeClr val="bg1">
-                      <a:lumMod val="95000"/>
-                    </a:schemeClr>
-                  </a:solidFill>
-                </a:rPr>
-                <a:t>nascetur</a:t>
-              </a:r>
-              <a:r>
-                <a:rPr lang="en-CA" sz="1400" dirty="0">
-                  <a:solidFill>
-                    <a:schemeClr val="bg1">
-                      <a:lumMod val="95000"/>
-                    </a:schemeClr>
-                  </a:solidFill>
-                </a:rPr>
-                <a:t> </a:t>
-              </a:r>
-              <a:r>
-                <a:rPr lang="en-CA" sz="1400" dirty="0" err="1">
-                  <a:solidFill>
-                    <a:schemeClr val="bg1">
-                      <a:lumMod val="95000"/>
-                    </a:schemeClr>
-                  </a:solidFill>
-                </a:rPr>
-                <a:t>ridiculus</a:t>
-              </a:r>
-              <a:r>
-                <a:rPr lang="en-CA" sz="1400" dirty="0">
-                  <a:solidFill>
-                    <a:schemeClr val="bg1">
-                      <a:lumMod val="95000"/>
-                    </a:schemeClr>
-                  </a:solidFill>
-                </a:rPr>
-                <a:t> mus. Donec </a:t>
-              </a:r>
-              <a:r>
-                <a:rPr lang="en-CA" sz="1400" dirty="0" err="1">
-                  <a:solidFill>
-                    <a:schemeClr val="bg1">
-                      <a:lumMod val="95000"/>
-                    </a:schemeClr>
-                  </a:solidFill>
-                </a:rPr>
-                <a:t>molestie</a:t>
-              </a:r>
-              <a:r>
-                <a:rPr lang="en-CA" sz="1400" dirty="0">
-                  <a:solidFill>
-                    <a:schemeClr val="bg1">
-                      <a:lumMod val="95000"/>
-                    </a:schemeClr>
-                  </a:solidFill>
-                </a:rPr>
-                <a:t> </a:t>
-              </a:r>
-              <a:r>
-                <a:rPr lang="en-CA" sz="1400" dirty="0" err="1">
-                  <a:solidFill>
-                    <a:schemeClr val="bg1">
-                      <a:lumMod val="95000"/>
-                    </a:schemeClr>
-                  </a:solidFill>
-                </a:rPr>
-                <a:t>ullamcorper</a:t>
-              </a:r>
-              <a:r>
-                <a:rPr lang="en-CA" sz="1400" dirty="0">
-                  <a:solidFill>
-                    <a:schemeClr val="bg1">
-                      <a:lumMod val="95000"/>
-                    </a:schemeClr>
-                  </a:solidFill>
-                </a:rPr>
-                <a:t> lorem sed </a:t>
-              </a:r>
-              <a:r>
-                <a:rPr lang="en-CA" sz="1400" dirty="0" err="1">
-                  <a:solidFill>
-                    <a:schemeClr val="bg1">
-                      <a:lumMod val="95000"/>
-                    </a:schemeClr>
-                  </a:solidFill>
-                </a:rPr>
-                <a:t>sodales</a:t>
-              </a:r>
-              <a:r>
-                <a:rPr lang="en-CA" sz="1400" dirty="0">
-                  <a:solidFill>
-                    <a:schemeClr val="bg1">
-                      <a:lumMod val="95000"/>
-                    </a:schemeClr>
-                  </a:solidFill>
-                </a:rPr>
-                <a:t>.</a:t>
-              </a:r>
-            </a:p>
-          </p:txBody>
-        </p:sp>
-        <p:sp>
-          <p:nvSpPr>
-            <p:cNvPr id="13" name="TextBox 12">
-              <a:extLst>
-                <a:ext uri="{FF2B5EF4-FFF2-40B4-BE49-F238E27FC236}">
-                  <a16:creationId xmlns:a16="http://schemas.microsoft.com/office/drawing/2014/main" id="{BB967B02-0DC9-7DEA-C350-4A802AB0D028}"/>
-                </a:ext>
-              </a:extLst>
-            </p:cNvPr>
-            <p:cNvSpPr txBox="1"/>
-            <p:nvPr/>
-          </p:nvSpPr>
-          <p:spPr>
-            <a:xfrm>
-              <a:off x="5320490" y="1348908"/>
-              <a:ext cx="6390425" cy="738664"/>
-            </a:xfrm>
-            <a:prstGeom prst="rect">
-              <a:avLst/>
-            </a:prstGeom>
-            <a:noFill/>
-          </p:spPr>
-          <p:txBody>
-            <a:bodyPr wrap="square" rtlCol="0">
-              <a:spAutoFit/>
-            </a:bodyPr>
-            <a:lstStyle/>
-            <a:p>
-              <a:r>
-                <a:rPr lang="en-CA" sz="1400" dirty="0" err="1">
-                  <a:solidFill>
-                    <a:schemeClr val="bg1">
-                      <a:lumMod val="95000"/>
-                    </a:schemeClr>
-                  </a:solidFill>
-                </a:rPr>
-                <a:t>Vivamus</a:t>
-              </a:r>
-              <a:r>
-                <a:rPr lang="en-CA" sz="1400" dirty="0">
-                  <a:solidFill>
-                    <a:schemeClr val="bg1">
-                      <a:lumMod val="95000"/>
-                    </a:schemeClr>
-                  </a:solidFill>
-                </a:rPr>
-                <a:t> semper </a:t>
-              </a:r>
-              <a:r>
-                <a:rPr lang="en-CA" sz="1400" dirty="0" err="1">
-                  <a:solidFill>
-                    <a:schemeClr val="bg1">
-                      <a:lumMod val="95000"/>
-                    </a:schemeClr>
-                  </a:solidFill>
-                </a:rPr>
-                <a:t>leo</a:t>
-              </a:r>
-              <a:r>
-                <a:rPr lang="en-CA" sz="1400" dirty="0">
-                  <a:solidFill>
-                    <a:schemeClr val="bg1">
-                      <a:lumMod val="95000"/>
-                    </a:schemeClr>
-                  </a:solidFill>
-                </a:rPr>
-                <a:t> </a:t>
-              </a:r>
-              <a:r>
-                <a:rPr lang="en-CA" sz="1400" dirty="0" err="1">
-                  <a:solidFill>
-                    <a:schemeClr val="bg1">
-                      <a:lumMod val="95000"/>
-                    </a:schemeClr>
-                  </a:solidFill>
-                </a:rPr>
-                <a:t>ut</a:t>
-              </a:r>
-              <a:r>
-                <a:rPr lang="en-CA" sz="1400" dirty="0">
-                  <a:solidFill>
-                    <a:schemeClr val="bg1">
-                      <a:lumMod val="95000"/>
-                    </a:schemeClr>
-                  </a:solidFill>
-                </a:rPr>
-                <a:t> </a:t>
-              </a:r>
-              <a:r>
-                <a:rPr lang="en-CA" sz="1400" dirty="0" err="1">
-                  <a:solidFill>
-                    <a:schemeClr val="bg1">
-                      <a:lumMod val="95000"/>
-                    </a:schemeClr>
-                  </a:solidFill>
-                </a:rPr>
-                <a:t>nunc</a:t>
-              </a:r>
-              <a:r>
-                <a:rPr lang="en-CA" sz="1400" dirty="0">
-                  <a:solidFill>
-                    <a:schemeClr val="bg1">
-                      <a:lumMod val="95000"/>
-                    </a:schemeClr>
-                  </a:solidFill>
-                </a:rPr>
-                <a:t> </a:t>
-              </a:r>
-              <a:r>
-                <a:rPr lang="en-CA" sz="1400" dirty="0" err="1">
-                  <a:solidFill>
-                    <a:schemeClr val="bg1">
-                      <a:lumMod val="95000"/>
-                    </a:schemeClr>
-                  </a:solidFill>
-                </a:rPr>
-                <a:t>venenatis</a:t>
-              </a:r>
-              <a:r>
-                <a:rPr lang="en-CA" sz="1400" dirty="0">
-                  <a:solidFill>
-                    <a:schemeClr val="bg1">
-                      <a:lumMod val="95000"/>
-                    </a:schemeClr>
-                  </a:solidFill>
-                </a:rPr>
-                <a:t>, sed auctor </a:t>
-              </a:r>
-              <a:r>
-                <a:rPr lang="en-CA" sz="1400" dirty="0" err="1">
-                  <a:solidFill>
-                    <a:schemeClr val="bg1">
-                      <a:lumMod val="95000"/>
-                    </a:schemeClr>
-                  </a:solidFill>
-                </a:rPr>
-                <a:t>urna</a:t>
-              </a:r>
-              <a:r>
-                <a:rPr lang="en-CA" sz="1400" dirty="0">
-                  <a:solidFill>
-                    <a:schemeClr val="bg1">
-                      <a:lumMod val="95000"/>
-                    </a:schemeClr>
-                  </a:solidFill>
-                </a:rPr>
-                <a:t> vestibulum. </a:t>
-              </a:r>
-              <a:r>
-                <a:rPr lang="en-CA" sz="1400" dirty="0" err="1">
-                  <a:solidFill>
-                    <a:schemeClr val="bg1">
-                      <a:lumMod val="95000"/>
-                    </a:schemeClr>
-                  </a:solidFill>
-                </a:rPr>
-                <a:t>Curabitur</a:t>
-              </a:r>
-              <a:r>
-                <a:rPr lang="en-CA" sz="1400" dirty="0">
-                  <a:solidFill>
-                    <a:schemeClr val="bg1">
-                      <a:lumMod val="95000"/>
-                    </a:schemeClr>
-                  </a:solidFill>
-                </a:rPr>
-                <a:t> semper </a:t>
-              </a:r>
-              <a:r>
-                <a:rPr lang="en-CA" sz="1400" dirty="0" err="1">
-                  <a:solidFill>
-                    <a:schemeClr val="bg1">
-                      <a:lumMod val="95000"/>
-                    </a:schemeClr>
-                  </a:solidFill>
-                </a:rPr>
-                <a:t>ut</a:t>
-              </a:r>
-              <a:r>
-                <a:rPr lang="en-CA" sz="1400" dirty="0">
-                  <a:solidFill>
-                    <a:schemeClr val="bg1">
-                      <a:lumMod val="95000"/>
-                    </a:schemeClr>
-                  </a:solidFill>
-                </a:rPr>
-                <a:t> </a:t>
-              </a:r>
-              <a:r>
-                <a:rPr lang="en-CA" sz="1400" dirty="0" err="1">
-                  <a:solidFill>
-                    <a:schemeClr val="bg1">
-                      <a:lumMod val="95000"/>
-                    </a:schemeClr>
-                  </a:solidFill>
-                </a:rPr>
-                <a:t>risus</a:t>
-              </a:r>
-              <a:r>
-                <a:rPr lang="en-CA" sz="1400" dirty="0">
-                  <a:solidFill>
-                    <a:schemeClr val="bg1">
-                      <a:lumMod val="95000"/>
-                    </a:schemeClr>
-                  </a:solidFill>
-                </a:rPr>
-                <a:t> porta </a:t>
-              </a:r>
-              <a:r>
-                <a:rPr lang="en-CA" sz="1400" dirty="0" err="1">
-                  <a:solidFill>
-                    <a:schemeClr val="bg1">
-                      <a:lumMod val="95000"/>
-                    </a:schemeClr>
-                  </a:solidFill>
-                </a:rPr>
-                <a:t>sagittis</a:t>
-              </a:r>
-              <a:r>
-                <a:rPr lang="en-CA" sz="1400" dirty="0">
-                  <a:solidFill>
-                    <a:schemeClr val="bg1">
-                      <a:lumMod val="95000"/>
-                    </a:schemeClr>
-                  </a:solidFill>
-                </a:rPr>
-                <a:t>. </a:t>
-              </a:r>
-              <a:r>
-                <a:rPr lang="en-CA" sz="1400" dirty="0" err="1">
-                  <a:solidFill>
-                    <a:schemeClr val="bg1">
-                      <a:lumMod val="95000"/>
-                    </a:schemeClr>
-                  </a:solidFill>
-                </a:rPr>
-                <a:t>Pellentesque</a:t>
-              </a:r>
-              <a:r>
-                <a:rPr lang="en-CA" sz="1400" dirty="0">
-                  <a:solidFill>
-                    <a:schemeClr val="bg1">
-                      <a:lumMod val="95000"/>
-                    </a:schemeClr>
-                  </a:solidFill>
-                </a:rPr>
-                <a:t> </a:t>
-              </a:r>
-              <a:r>
-                <a:rPr lang="en-CA" sz="1400" dirty="0" err="1">
-                  <a:solidFill>
-                    <a:schemeClr val="bg1">
-                      <a:lumMod val="95000"/>
-                    </a:schemeClr>
-                  </a:solidFill>
-                </a:rPr>
-                <a:t>laoreet</a:t>
-              </a:r>
-              <a:r>
-                <a:rPr lang="en-CA" sz="1400" dirty="0">
-                  <a:solidFill>
-                    <a:schemeClr val="bg1">
-                      <a:lumMod val="95000"/>
-                    </a:schemeClr>
-                  </a:solidFill>
-                </a:rPr>
-                <a:t> </a:t>
-              </a:r>
-              <a:r>
-                <a:rPr lang="en-CA" sz="1400" dirty="0" err="1">
-                  <a:solidFill>
-                    <a:schemeClr val="bg1">
-                      <a:lumMod val="95000"/>
-                    </a:schemeClr>
-                  </a:solidFill>
-                </a:rPr>
-                <a:t>metus</a:t>
-              </a:r>
-              <a:r>
-                <a:rPr lang="en-CA" sz="1400" dirty="0">
-                  <a:solidFill>
-                    <a:schemeClr val="bg1">
-                      <a:lumMod val="95000"/>
-                    </a:schemeClr>
-                  </a:solidFill>
-                </a:rPr>
-                <a:t> a dui </a:t>
-              </a:r>
-              <a:r>
-                <a:rPr lang="en-CA" sz="1400" dirty="0" err="1">
-                  <a:solidFill>
-                    <a:schemeClr val="bg1">
-                      <a:lumMod val="95000"/>
-                    </a:schemeClr>
-                  </a:solidFill>
-                </a:rPr>
-                <a:t>hendrerit</a:t>
-              </a:r>
-              <a:r>
-                <a:rPr lang="en-CA" sz="1400" dirty="0">
-                  <a:solidFill>
-                    <a:schemeClr val="bg1">
-                      <a:lumMod val="95000"/>
-                    </a:schemeClr>
-                  </a:solidFill>
-                </a:rPr>
-                <a:t>, </a:t>
-              </a:r>
-              <a:r>
-                <a:rPr lang="en-CA" sz="1400" dirty="0" err="1">
-                  <a:solidFill>
-                    <a:schemeClr val="bg1">
-                      <a:lumMod val="95000"/>
-                    </a:schemeClr>
-                  </a:solidFill>
-                </a:rPr>
-                <a:t>eget</a:t>
-              </a:r>
-              <a:r>
-                <a:rPr lang="en-CA" sz="1400" dirty="0">
-                  <a:solidFill>
-                    <a:schemeClr val="bg1">
-                      <a:lumMod val="95000"/>
-                    </a:schemeClr>
-                  </a:solidFill>
-                </a:rPr>
-                <a:t> </a:t>
-              </a:r>
-              <a:r>
-                <a:rPr lang="en-CA" sz="1400" dirty="0" err="1">
-                  <a:solidFill>
-                    <a:schemeClr val="bg1">
-                      <a:lumMod val="95000"/>
-                    </a:schemeClr>
-                  </a:solidFill>
-                </a:rPr>
-                <a:t>porttitor</a:t>
-              </a:r>
-              <a:r>
-                <a:rPr lang="en-CA" sz="1400" dirty="0">
-                  <a:solidFill>
-                    <a:schemeClr val="bg1">
-                      <a:lumMod val="95000"/>
-                    </a:schemeClr>
-                  </a:solidFill>
-                </a:rPr>
-                <a:t> </a:t>
-              </a:r>
-              <a:r>
-                <a:rPr lang="en-CA" sz="1400" dirty="0" err="1">
-                  <a:solidFill>
-                    <a:schemeClr val="bg1">
-                      <a:lumMod val="95000"/>
-                    </a:schemeClr>
-                  </a:solidFill>
-                </a:rPr>
-                <a:t>metus</a:t>
-              </a:r>
-              <a:r>
-                <a:rPr lang="en-CA" sz="1400" dirty="0">
-                  <a:solidFill>
-                    <a:schemeClr val="bg1">
-                      <a:lumMod val="95000"/>
-                    </a:schemeClr>
-                  </a:solidFill>
-                </a:rPr>
-                <a:t> </a:t>
-              </a:r>
-              <a:r>
-                <a:rPr lang="en-CA" sz="1400" dirty="0" err="1">
-                  <a:solidFill>
-                    <a:schemeClr val="bg1">
-                      <a:lumMod val="95000"/>
-                    </a:schemeClr>
-                  </a:solidFill>
-                </a:rPr>
-                <a:t>vehicula</a:t>
-              </a:r>
-              <a:r>
-                <a:rPr lang="en-CA" sz="1400" dirty="0">
-                  <a:solidFill>
-                    <a:schemeClr val="bg1">
-                      <a:lumMod val="95000"/>
-                    </a:schemeClr>
-                  </a:solidFill>
-                </a:rPr>
-                <a:t>. </a:t>
-              </a:r>
-            </a:p>
-          </p:txBody>
-        </p:sp>
-        <p:sp>
-          <p:nvSpPr>
-            <p:cNvPr id="19" name="Rectangle 18">
-              <a:extLst>
-                <a:ext uri="{FF2B5EF4-FFF2-40B4-BE49-F238E27FC236}">
-                  <a16:creationId xmlns:a16="http://schemas.microsoft.com/office/drawing/2014/main" id="{63C670FE-C01D-5E18-CFFE-02E74308CFF3}"/>
-                </a:ext>
-              </a:extLst>
-            </p:cNvPr>
-            <p:cNvSpPr/>
-            <p:nvPr/>
-          </p:nvSpPr>
-          <p:spPr>
-            <a:xfrm>
-              <a:off x="5389350" y="2261767"/>
-              <a:ext cx="6390425" cy="2806344"/>
-            </a:xfrm>
-            <a:prstGeom prst="rect">
-              <a:avLst/>
-            </a:prstGeom>
-            <a:solidFill>
-              <a:schemeClr val="bg1"/>
-            </a:solidFill>
-          </p:spPr>
-          <p:style>
-            <a:lnRef idx="2">
-              <a:schemeClr val="accent1">
-                <a:shade val="15000"/>
-              </a:schemeClr>
-            </a:lnRef>
-            <a:fillRef idx="1">
-              <a:schemeClr val="accent1"/>
-            </a:fillRef>
-            <a:effectRef idx="0">
-              <a:schemeClr val="accent1"/>
-            </a:effectRef>
-            <a:fontRef idx="minor">
-              <a:schemeClr val="lt1"/>
-            </a:fontRef>
-          </p:style>
-          <p:txBody>
-            <a:bodyPr rtlCol="0" anchor="ctr"/>
-            <a:lstStyle/>
-            <a:p>
-              <a:pPr algn="ctr"/>
-              <a:r>
-                <a:rPr lang="en-US" dirty="0">
-                  <a:solidFill>
-                    <a:schemeClr val="tx1"/>
-                  </a:solidFill>
-                </a:rPr>
-                <a:t>Media</a:t>
-              </a:r>
-              <a:endParaRPr lang="en-CA" dirty="0">
-                <a:solidFill>
-                  <a:schemeClr val="tx1"/>
-                </a:solidFill>
-              </a:endParaRPr>
-            </a:p>
-          </p:txBody>
-        </p:sp>
-        <p:sp>
-          <p:nvSpPr>
-            <p:cNvPr id="26" name="TextBox 25">
-              <a:extLst>
-                <a:ext uri="{FF2B5EF4-FFF2-40B4-BE49-F238E27FC236}">
-                  <a16:creationId xmlns:a16="http://schemas.microsoft.com/office/drawing/2014/main" id="{1C64FB5E-2584-A57B-4D74-CD77FC2EEDBA}"/>
-                </a:ext>
-              </a:extLst>
-            </p:cNvPr>
-            <p:cNvSpPr txBox="1"/>
-            <p:nvPr/>
-          </p:nvSpPr>
-          <p:spPr>
-            <a:xfrm>
-              <a:off x="5330421" y="5189425"/>
-              <a:ext cx="6390425" cy="523220"/>
-            </a:xfrm>
-            <a:prstGeom prst="rect">
-              <a:avLst/>
-            </a:prstGeom>
-            <a:noFill/>
-          </p:spPr>
-          <p:txBody>
-            <a:bodyPr wrap="square" rtlCol="0">
-              <a:spAutoFit/>
-            </a:bodyPr>
-            <a:lstStyle/>
-            <a:p>
-              <a:r>
-                <a:rPr lang="en-CA" sz="1400" dirty="0" err="1">
-                  <a:solidFill>
-                    <a:schemeClr val="bg1">
-                      <a:lumMod val="95000"/>
-                    </a:schemeClr>
-                  </a:solidFill>
-                </a:rPr>
-                <a:t>Vivamus</a:t>
-              </a:r>
-              <a:r>
-                <a:rPr lang="en-CA" sz="1400" dirty="0">
-                  <a:solidFill>
-                    <a:schemeClr val="bg1">
-                      <a:lumMod val="95000"/>
-                    </a:schemeClr>
-                  </a:solidFill>
-                </a:rPr>
-                <a:t> semper </a:t>
-              </a:r>
-              <a:r>
-                <a:rPr lang="en-CA" sz="1400" dirty="0" err="1">
-                  <a:solidFill>
-                    <a:schemeClr val="bg1">
-                      <a:lumMod val="95000"/>
-                    </a:schemeClr>
-                  </a:solidFill>
-                </a:rPr>
-                <a:t>leo</a:t>
-              </a:r>
-              <a:r>
-                <a:rPr lang="en-CA" sz="1400" dirty="0">
-                  <a:solidFill>
-                    <a:schemeClr val="bg1">
-                      <a:lumMod val="95000"/>
-                    </a:schemeClr>
-                  </a:solidFill>
-                </a:rPr>
-                <a:t> </a:t>
-              </a:r>
-              <a:r>
-                <a:rPr lang="en-CA" sz="1400" dirty="0" err="1">
-                  <a:solidFill>
-                    <a:schemeClr val="bg1">
-                      <a:lumMod val="95000"/>
-                    </a:schemeClr>
-                  </a:solidFill>
-                </a:rPr>
-                <a:t>ut</a:t>
-              </a:r>
-              <a:r>
-                <a:rPr lang="en-CA" sz="1400" dirty="0">
-                  <a:solidFill>
-                    <a:schemeClr val="bg1">
-                      <a:lumMod val="95000"/>
-                    </a:schemeClr>
-                  </a:solidFill>
-                </a:rPr>
-                <a:t> </a:t>
-              </a:r>
-              <a:r>
-                <a:rPr lang="en-CA" sz="1400" dirty="0" err="1">
-                  <a:solidFill>
-                    <a:schemeClr val="bg1">
-                      <a:lumMod val="95000"/>
-                    </a:schemeClr>
-                  </a:solidFill>
-                </a:rPr>
-                <a:t>nunc</a:t>
-              </a:r>
-              <a:r>
-                <a:rPr lang="en-CA" sz="1400" dirty="0">
-                  <a:solidFill>
-                    <a:schemeClr val="bg1">
-                      <a:lumMod val="95000"/>
-                    </a:schemeClr>
-                  </a:solidFill>
-                </a:rPr>
-                <a:t> </a:t>
-              </a:r>
-              <a:r>
-                <a:rPr lang="en-CA" sz="1400" dirty="0" err="1">
-                  <a:solidFill>
-                    <a:schemeClr val="bg1">
-                      <a:lumMod val="95000"/>
-                    </a:schemeClr>
-                  </a:solidFill>
-                </a:rPr>
-                <a:t>venenatis</a:t>
-              </a:r>
-              <a:r>
-                <a:rPr lang="en-CA" sz="1400" dirty="0">
-                  <a:solidFill>
-                    <a:schemeClr val="bg1">
-                      <a:lumMod val="95000"/>
-                    </a:schemeClr>
-                  </a:solidFill>
-                </a:rPr>
-                <a:t>, sed auctor </a:t>
-              </a:r>
-              <a:r>
-                <a:rPr lang="en-CA" sz="1400" dirty="0" err="1">
-                  <a:solidFill>
-                    <a:schemeClr val="bg1">
-                      <a:lumMod val="95000"/>
-                    </a:schemeClr>
-                  </a:solidFill>
-                </a:rPr>
-                <a:t>urna</a:t>
-              </a:r>
-              <a:r>
-                <a:rPr lang="en-CA" sz="1400" dirty="0">
-                  <a:solidFill>
-                    <a:schemeClr val="bg1">
-                      <a:lumMod val="95000"/>
-                    </a:schemeClr>
-                  </a:solidFill>
-                </a:rPr>
-                <a:t> vestibulum. </a:t>
-              </a:r>
-              <a:r>
-                <a:rPr lang="en-CA" sz="1400" dirty="0" err="1">
-                  <a:solidFill>
-                    <a:schemeClr val="bg1">
-                      <a:lumMod val="95000"/>
-                    </a:schemeClr>
-                  </a:solidFill>
-                </a:rPr>
-                <a:t>Curabitur</a:t>
-              </a:r>
-              <a:r>
-                <a:rPr lang="en-CA" sz="1400" dirty="0">
-                  <a:solidFill>
-                    <a:schemeClr val="bg1">
-                      <a:lumMod val="95000"/>
-                    </a:schemeClr>
-                  </a:solidFill>
-                </a:rPr>
-                <a:t> semper </a:t>
-              </a:r>
-              <a:r>
-                <a:rPr lang="en-CA" sz="1400" dirty="0" err="1">
-                  <a:solidFill>
-                    <a:schemeClr val="bg1">
-                      <a:lumMod val="95000"/>
-                    </a:schemeClr>
-                  </a:solidFill>
-                </a:rPr>
-                <a:t>ut</a:t>
-              </a:r>
-              <a:r>
-                <a:rPr lang="en-CA" sz="1400" dirty="0">
-                  <a:solidFill>
-                    <a:schemeClr val="bg1">
-                      <a:lumMod val="95000"/>
-                    </a:schemeClr>
-                  </a:solidFill>
-                </a:rPr>
-                <a:t> </a:t>
-              </a:r>
-              <a:r>
-                <a:rPr lang="en-CA" sz="1400" dirty="0" err="1">
-                  <a:solidFill>
-                    <a:schemeClr val="bg1">
-                      <a:lumMod val="95000"/>
-                    </a:schemeClr>
-                  </a:solidFill>
-                </a:rPr>
-                <a:t>risus</a:t>
-              </a:r>
-              <a:r>
-                <a:rPr lang="en-CA" sz="1400" dirty="0">
-                  <a:solidFill>
-                    <a:schemeClr val="bg1">
-                      <a:lumMod val="95000"/>
-                    </a:schemeClr>
-                  </a:solidFill>
-                </a:rPr>
-                <a:t> porta </a:t>
-              </a:r>
-              <a:r>
-                <a:rPr lang="en-CA" sz="1400" dirty="0" err="1">
-                  <a:solidFill>
-                    <a:schemeClr val="bg1">
-                      <a:lumMod val="95000"/>
-                    </a:schemeClr>
-                  </a:solidFill>
-                </a:rPr>
-                <a:t>sagittis</a:t>
-              </a:r>
-              <a:r>
-                <a:rPr lang="en-CA" sz="1400" dirty="0">
-                  <a:solidFill>
-                    <a:schemeClr val="bg1">
-                      <a:lumMod val="95000"/>
-                    </a:schemeClr>
-                  </a:solidFill>
-                </a:rPr>
-                <a:t>. </a:t>
-              </a:r>
-            </a:p>
-          </p:txBody>
-        </p:sp>
-      </p:grpSp>
-      <p:grpSp>
-        <p:nvGrpSpPr>
-          <p:cNvPr id="23" name="Group 22">
-            <a:extLst>
-              <a:ext uri="{FF2B5EF4-FFF2-40B4-BE49-F238E27FC236}">
-                <a16:creationId xmlns:a16="http://schemas.microsoft.com/office/drawing/2014/main" id="{9FFBE8FD-5E02-BC1F-2A50-02C393C268A8}"/>
-              </a:ext>
-            </a:extLst>
-          </p:cNvPr>
-          <p:cNvGrpSpPr/>
-          <p:nvPr/>
-        </p:nvGrpSpPr>
-        <p:grpSpPr>
-          <a:xfrm>
-            <a:off x="11530892" y="229877"/>
-            <a:ext cx="288000" cy="288000"/>
-            <a:chOff x="11656966" y="229877"/>
-            <a:chExt cx="288000" cy="288000"/>
-          </a:xfrm>
-        </p:grpSpPr>
-        <p:sp>
-          <p:nvSpPr>
-            <p:cNvPr id="24" name="Oval 23">
-              <a:extLst>
-                <a:ext uri="{FF2B5EF4-FFF2-40B4-BE49-F238E27FC236}">
-                  <a16:creationId xmlns:a16="http://schemas.microsoft.com/office/drawing/2014/main" id="{51E136D7-F6C6-9674-A5B1-BCEA2FA4E5FA}"/>
-                </a:ext>
-              </a:extLst>
-            </p:cNvPr>
-            <p:cNvSpPr/>
-            <p:nvPr/>
-          </p:nvSpPr>
-          <p:spPr>
-            <a:xfrm>
-              <a:off x="11656966" y="229877"/>
-              <a:ext cx="288000" cy="288000"/>
-            </a:xfrm>
-            <a:prstGeom prst="ellipse">
-              <a:avLst/>
-            </a:prstGeom>
-            <a:solidFill>
-              <a:schemeClr val="accent1">
-                <a:lumMod val="20000"/>
-                <a:lumOff val="80000"/>
-              </a:schemeClr>
-            </a:solidFill>
-            <a:ln w="12700">
-              <a:noFill/>
-            </a:ln>
-          </p:spPr>
-          <p:style>
-            <a:lnRef idx="2">
-              <a:schemeClr val="accent1">
-                <a:shade val="15000"/>
-              </a:schemeClr>
-            </a:lnRef>
-            <a:fillRef idx="1">
-              <a:schemeClr val="accent1"/>
-            </a:fillRef>
-            <a:effectRef idx="0">
-              <a:schemeClr val="accent1"/>
-            </a:effectRef>
-            <a:fontRef idx="minor">
-              <a:schemeClr val="lt1"/>
-            </a:fontRef>
-          </p:style>
-          <p:txBody>
-            <a:bodyPr rtlCol="0" anchor="ctr"/>
-            <a:lstStyle/>
-            <a:p>
-              <a:pPr algn="ctr"/>
-              <a:endParaRPr lang="en-CA" sz="1200" dirty="0"/>
-            </a:p>
-          </p:txBody>
-        </p:sp>
-        <p:sp>
-          <p:nvSpPr>
-            <p:cNvPr id="25" name="Rectangle 24">
-              <a:extLst>
-                <a:ext uri="{FF2B5EF4-FFF2-40B4-BE49-F238E27FC236}">
-                  <a16:creationId xmlns:a16="http://schemas.microsoft.com/office/drawing/2014/main" id="{23DEE08F-D08B-71D0-E314-697B2CF88D97}"/>
-                </a:ext>
-              </a:extLst>
-            </p:cNvPr>
-            <p:cNvSpPr/>
-            <p:nvPr/>
-          </p:nvSpPr>
-          <p:spPr>
-            <a:xfrm flipV="1">
-              <a:off x="11704007" y="339796"/>
-              <a:ext cx="194400" cy="72000"/>
-            </a:xfrm>
-            <a:prstGeom prst="rect">
-              <a:avLst/>
-            </a:prstGeom>
-            <a:solidFill>
-              <a:schemeClr val="accent1">
-                <a:lumMod val="75000"/>
-              </a:schemeClr>
-            </a:solidFill>
-            <a:ln>
-              <a:noFill/>
-            </a:ln>
-          </p:spPr>
-          <p:style>
-            <a:lnRef idx="2">
-              <a:schemeClr val="accent1">
-                <a:shade val="15000"/>
-              </a:schemeClr>
-            </a:lnRef>
-            <a:fillRef idx="1">
-              <a:schemeClr val="accent1"/>
-            </a:fillRef>
-            <a:effectRef idx="0">
-              <a:schemeClr val="accent1"/>
-            </a:effectRef>
-            <a:fontRef idx="minor">
-              <a:schemeClr val="lt1"/>
-            </a:fontRef>
-          </p:style>
-          <p:txBody>
-            <a:bodyPr rtlCol="0" anchor="ctr"/>
-            <a:lstStyle/>
-            <a:p>
-              <a:pPr algn="ctr"/>
-              <a:endParaRPr lang="en-CA" dirty="0"/>
-            </a:p>
-          </p:txBody>
-        </p:sp>
-      </p:grpSp>
-    </p:spTree>
-    <p:extLst>
-      <p:ext uri="{BB962C8B-B14F-4D97-AF65-F5344CB8AC3E}">
-        <p14:creationId xmlns:p14="http://schemas.microsoft.com/office/powerpoint/2010/main" val="779978027"/>
-      </p:ext>
-    </p:extLst>
-  </p:cSld>
-  <p:clrMapOvr>
-    <a:masterClrMapping/>
-  </p:clrMapOvr>
-  <p:timing>
-    <p:tnLst>
-      <p:par>
-        <p:cTn id="1" dur="indefinite" restart="never" nodeType="tmRoot">
-          <p:childTnLst>
-            <p:seq concurrent="1" nextAc="seek">
-              <p:cTn id="2" dur="indefinite" nodeType="mainSeq">
-                <p:childTnLst>
-                  <p:par>
-                    <p:cTn id="3" fill="hold">
-                      <p:stCondLst>
-                        <p:cond delay="indefinite"/>
-                      </p:stCondLst>
-                      <p:childTnLst>
-                        <p:par>
-                          <p:cTn id="4" fill="hold">
-                            <p:stCondLst>
-                              <p:cond delay="0"/>
-                            </p:stCondLst>
-                            <p:childTnLst>
-                              <p:par>
-                                <p:cTn id="5" presetID="10" presetClass="entr" presetSubtype="0" fill="hold" nodeType="clickEffect">
-                                  <p:stCondLst>
-                                    <p:cond delay="0"/>
-                                  </p:stCondLst>
-                                  <p:childTnLst>
-                                    <p:set>
-                                      <p:cBhvr>
-                                        <p:cTn id="6" dur="1" fill="hold">
-                                          <p:stCondLst>
-                                            <p:cond delay="0"/>
-                                          </p:stCondLst>
-                                        </p:cTn>
-                                        <p:tgtEl>
-                                          <p:spTgt spid="27"/>
-                                        </p:tgtEl>
-                                        <p:attrNameLst>
-                                          <p:attrName>style.visibility</p:attrName>
-                                        </p:attrNameLst>
-                                      </p:cBhvr>
-                                      <p:to>
-                                        <p:strVal val="visible"/>
-                                      </p:to>
-                                    </p:set>
-                                    <p:animEffect transition="in" filter="fade">
-                                      <p:cBhvr>
-                                        <p:cTn id="7" dur="500"/>
-                                        <p:tgtEl>
-                                          <p:spTgt spid="27"/>
-                                        </p:tgtEl>
-                                      </p:cBhvr>
-                                    </p:animEffect>
-                                  </p:childTnLst>
-                                </p:cTn>
-                              </p:par>
-                              <p:par>
-                                <p:cTn id="8" presetID="10" presetClass="entr" presetSubtype="0" fill="hold" nodeType="withEffect">
-                                  <p:stCondLst>
-                                    <p:cond delay="0"/>
-                                  </p:stCondLst>
-                                  <p:childTnLst>
-                                    <p:set>
-                                      <p:cBhvr>
-                                        <p:cTn id="9" dur="1" fill="hold">
-                                          <p:stCondLst>
-                                            <p:cond delay="0"/>
-                                          </p:stCondLst>
-                                        </p:cTn>
-                                        <p:tgtEl>
-                                          <p:spTgt spid="23"/>
-                                        </p:tgtEl>
-                                        <p:attrNameLst>
-                                          <p:attrName>style.visibility</p:attrName>
-                                        </p:attrNameLst>
-                                      </p:cBhvr>
-                                      <p:to>
-                                        <p:strVal val="visible"/>
-                                      </p:to>
-                                    </p:set>
-                                    <p:animEffect transition="in" filter="fade">
-                                      <p:cBhvr>
-                                        <p:cTn id="10" dur="500"/>
-                                        <p:tgtEl>
-                                          <p:spTgt spid="23"/>
-                                        </p:tgtEl>
-                                      </p:cBhvr>
-                                    </p:animEffect>
-                                  </p:childTnLst>
-                                </p:cTn>
-                              </p:par>
-                            </p:childTnLst>
-                          </p:cTn>
-                        </p:par>
-                      </p:childTnLst>
-                    </p:cTn>
-                  </p:par>
-                </p:childTnLst>
-              </p:cTn>
-              <p:prevCondLst>
-                <p:cond evt="onPrev" delay="0">
-                  <p:tgtEl>
-                    <p:sldTgt/>
-                  </p:tgtEl>
-                </p:cond>
-              </p:prevCondLst>
-              <p:nextCondLst>
-                <p:cond evt="onNext" delay="0">
-                  <p:tgtEl>
-                    <p:sldTgt/>
-                  </p:tgtEl>
-                </p:cond>
-              </p:nextCondLst>
-            </p:seq>
-          </p:childTnLst>
-        </p:cTn>
-      </p:par>
-    </p:tnLst>
-  </p:timing>
-  <p:extLst>
-    <p:ext uri="{6950BFC3-D8DA-4A85-94F7-54DA5524770B}">
-      <p188:commentRel xmlns:p188="http://schemas.microsoft.com/office/powerpoint/2018/8/main" r:id="rId2"/>
-    </p:ext>
-  </p:extLst>
-</p:sld>
-</file>
-
-<file path=ppt/slides/slide5.xml><?xml version="1.0" encoding="utf-8"?>
 <p:sld xmlns:a="http://schemas.openxmlformats.org/drawingml/2006/main" xmlns:r="http://schemas.openxmlformats.org/officeDocument/2006/relationships" xmlns:p="http://schemas.openxmlformats.org/presentationml/2006/main">
   <p:cSld>
     <p:spTree>
@@ -13272,7 +10589,7 @@
 </p:sld>
 </file>
 
-<file path=ppt/slides/slide6.xml><?xml version="1.0" encoding="utf-8"?>
+<file path=ppt/slides/slide5.xml><?xml version="1.0" encoding="utf-8"?>
 <p:sld xmlns:a="http://schemas.openxmlformats.org/drawingml/2006/main" xmlns:r="http://schemas.openxmlformats.org/officeDocument/2006/relationships" xmlns:p="http://schemas.openxmlformats.org/presentationml/2006/main">
   <p:cSld>
     <p:spTree>

</xml_diff>